<commit_message>
Updated intro materials + added first java project
</commit_message>
<xml_diff>
--- a/intro.pptx
+++ b/intro.pptx
@@ -5,7 +5,7 @@
     <p:sldMasterId id="2147483648" r:id="rId1"/>
   </p:sldMasterIdLst>
   <p:notesMasterIdLst>
-    <p:notesMasterId r:id="rId14"/>
+    <p:notesMasterId r:id="rId13"/>
   </p:notesMasterIdLst>
   <p:sldIdLst>
     <p:sldId id="256" r:id="rId2"/>
@@ -17,9 +17,8 @@
     <p:sldId id="262" r:id="rId8"/>
     <p:sldId id="264" r:id="rId9"/>
     <p:sldId id="265" r:id="rId10"/>
-    <p:sldId id="267" r:id="rId11"/>
-    <p:sldId id="266" r:id="rId12"/>
-    <p:sldId id="268" r:id="rId13"/>
+    <p:sldId id="266" r:id="rId11"/>
+    <p:sldId id="268" r:id="rId12"/>
   </p:sldIdLst>
   <p:sldSz cx="12192000" cy="6858000"/>
   <p:notesSz cx="6858000" cy="9144000"/>
@@ -118,6 +117,11 @@
       </a:defRPr>
     </a:lvl9pPr>
   </p:defaultTextStyle>
+  <p:extLst>
+    <p:ext uri="{EFAFB233-063F-42B5-8137-9DF3F51BA10A}">
+      <p15:sldGuideLst xmlns:p15="http://schemas.microsoft.com/office/powerpoint/2012/main"/>
+    </p:ext>
+  </p:extLst>
 </p:presentation>
 </file>
 
@@ -203,7 +207,7 @@
           <a:p>
             <a:fld id="{9A4FFBC6-D80B-5741-B242-3FC67C7D5463}" type="datetimeFigureOut">
               <a:rPr lang="en-US" smtClean="0"/>
-              <a:t>1/24/23</a:t>
+              <a:t>1/26/23</a:t>
             </a:fld>
             <a:endParaRPr lang="en-US"/>
           </a:p>
@@ -740,7 +744,7 @@
           <a:p>
             <a:fld id="{22A4ABED-DF90-4848-A60C-B4D72EDB3F88}" type="datetimeFigureOut">
               <a:rPr lang="en-US" smtClean="0"/>
-              <a:t>1/23/23</a:t>
+              <a:t>1/26/23</a:t>
             </a:fld>
             <a:endParaRPr lang="en-US"/>
           </a:p>
@@ -938,7 +942,7 @@
           <a:p>
             <a:fld id="{22A4ABED-DF90-4848-A60C-B4D72EDB3F88}" type="datetimeFigureOut">
               <a:rPr lang="en-US" smtClean="0"/>
-              <a:t>1/23/23</a:t>
+              <a:t>1/26/23</a:t>
             </a:fld>
             <a:endParaRPr lang="en-US"/>
           </a:p>
@@ -1146,7 +1150,7 @@
           <a:p>
             <a:fld id="{22A4ABED-DF90-4848-A60C-B4D72EDB3F88}" type="datetimeFigureOut">
               <a:rPr lang="en-US" smtClean="0"/>
-              <a:t>1/23/23</a:t>
+              <a:t>1/26/23</a:t>
             </a:fld>
             <a:endParaRPr lang="en-US"/>
           </a:p>
@@ -1344,7 +1348,7 @@
           <a:p>
             <a:fld id="{22A4ABED-DF90-4848-A60C-B4D72EDB3F88}" type="datetimeFigureOut">
               <a:rPr lang="en-US" smtClean="0"/>
-              <a:t>1/23/23</a:t>
+              <a:t>1/26/23</a:t>
             </a:fld>
             <a:endParaRPr lang="en-US"/>
           </a:p>
@@ -1619,7 +1623,7 @@
           <a:p>
             <a:fld id="{22A4ABED-DF90-4848-A60C-B4D72EDB3F88}" type="datetimeFigureOut">
               <a:rPr lang="en-US" smtClean="0"/>
-              <a:t>1/23/23</a:t>
+              <a:t>1/26/23</a:t>
             </a:fld>
             <a:endParaRPr lang="en-US"/>
           </a:p>
@@ -1884,7 +1888,7 @@
           <a:p>
             <a:fld id="{22A4ABED-DF90-4848-A60C-B4D72EDB3F88}" type="datetimeFigureOut">
               <a:rPr lang="en-US" smtClean="0"/>
-              <a:t>1/23/23</a:t>
+              <a:t>1/26/23</a:t>
             </a:fld>
             <a:endParaRPr lang="en-US"/>
           </a:p>
@@ -2296,7 +2300,7 @@
           <a:p>
             <a:fld id="{22A4ABED-DF90-4848-A60C-B4D72EDB3F88}" type="datetimeFigureOut">
               <a:rPr lang="en-US" smtClean="0"/>
-              <a:t>1/23/23</a:t>
+              <a:t>1/26/23</a:t>
             </a:fld>
             <a:endParaRPr lang="en-US"/>
           </a:p>
@@ -2437,7 +2441,7 @@
           <a:p>
             <a:fld id="{22A4ABED-DF90-4848-A60C-B4D72EDB3F88}" type="datetimeFigureOut">
               <a:rPr lang="en-US" smtClean="0"/>
-              <a:t>1/23/23</a:t>
+              <a:t>1/26/23</a:t>
             </a:fld>
             <a:endParaRPr lang="en-US"/>
           </a:p>
@@ -2550,7 +2554,7 @@
           <a:p>
             <a:fld id="{22A4ABED-DF90-4848-A60C-B4D72EDB3F88}" type="datetimeFigureOut">
               <a:rPr lang="en-US" smtClean="0"/>
-              <a:t>1/23/23</a:t>
+              <a:t>1/26/23</a:t>
             </a:fld>
             <a:endParaRPr lang="en-US"/>
           </a:p>
@@ -2861,7 +2865,7 @@
           <a:p>
             <a:fld id="{22A4ABED-DF90-4848-A60C-B4D72EDB3F88}" type="datetimeFigureOut">
               <a:rPr lang="en-US" smtClean="0"/>
-              <a:t>1/23/23</a:t>
+              <a:t>1/26/23</a:t>
             </a:fld>
             <a:endParaRPr lang="en-US"/>
           </a:p>
@@ -3149,7 +3153,7 @@
           <a:p>
             <a:fld id="{22A4ABED-DF90-4848-A60C-B4D72EDB3F88}" type="datetimeFigureOut">
               <a:rPr lang="en-US" smtClean="0"/>
-              <a:t>1/23/23</a:t>
+              <a:t>1/26/23</a:t>
             </a:fld>
             <a:endParaRPr lang="en-US"/>
           </a:p>
@@ -3390,7 +3394,7 @@
           <a:p>
             <a:fld id="{22A4ABED-DF90-4848-A60C-B4D72EDB3F88}" type="datetimeFigureOut">
               <a:rPr lang="en-US" smtClean="0"/>
-              <a:t>1/23/23</a:t>
+              <a:t>1/26/23</a:t>
             </a:fld>
             <a:endParaRPr lang="en-US"/>
           </a:p>
@@ -3906,2037 +3910,351 @@
           <a:chExt cx="0" cy="0"/>
         </a:xfrm>
       </p:grpSpPr>
-      <p:pic>
-        <p:nvPicPr>
-          <p:cNvPr id="7175" name="Picture 7" descr="page8image42820608">
-            <a:extLst>
-              <a:ext uri="{FF2B5EF4-FFF2-40B4-BE49-F238E27FC236}">
-                <a16:creationId xmlns:a16="http://schemas.microsoft.com/office/drawing/2014/main" id="{4E63A613-857D-9575-9042-DBB467AB581F}"/>
-              </a:ext>
-            </a:extLst>
-          </p:cNvPr>
-          <p:cNvPicPr>
-            <a:picLocks noChangeAspect="1" noChangeArrowheads="1"/>
-          </p:cNvPicPr>
-          <p:nvPr/>
-        </p:nvPicPr>
-        <p:blipFill>
-          <a:blip r:embed="rId2">
-            <a:extLst>
-              <a:ext uri="{28A0092B-C50C-407E-A947-70E740481C1C}">
-                <a14:useLocalDpi xmlns:a14="http://schemas.microsoft.com/office/drawing/2010/main" val="0"/>
-              </a:ext>
-            </a:extLst>
-          </a:blip>
-          <a:srcRect/>
-          <a:stretch>
-            <a:fillRect/>
-          </a:stretch>
-        </p:blipFill>
-        <p:spPr bwMode="auto">
-          <a:xfrm>
-            <a:off x="0" y="0"/>
-            <a:ext cx="7301216" cy="766934"/>
-          </a:xfrm>
-          <a:prstGeom prst="rect">
-            <a:avLst/>
-          </a:prstGeom>
-          <a:noFill/>
-          <a:extLst>
-            <a:ext uri="{909E8E84-426E-40DD-AFC4-6F175D3DCCD1}">
-              <a14:hiddenFill xmlns:a14="http://schemas.microsoft.com/office/drawing/2010/main">
-                <a:solidFill>
-                  <a:srgbClr val="FFFFFF"/>
-                </a:solidFill>
-              </a14:hiddenFill>
-            </a:ext>
-          </a:extLst>
-        </p:spPr>
-      </p:pic>
       <p:sp>
         <p:nvSpPr>
-          <p:cNvPr id="8" name="TextBox 7">
+          <p:cNvPr id="2" name="Title 1">
             <a:extLst>
               <a:ext uri="{FF2B5EF4-FFF2-40B4-BE49-F238E27FC236}">
-                <a16:creationId xmlns:a16="http://schemas.microsoft.com/office/drawing/2014/main" id="{3995CD26-0417-F583-0811-8A663B576C13}"/>
+                <a16:creationId xmlns:a16="http://schemas.microsoft.com/office/drawing/2014/main" id="{1F95CC1A-3F70-23D6-7F89-0DFA6A0FA11F}"/>
               </a:ext>
             </a:extLst>
           </p:cNvPr>
-          <p:cNvSpPr txBox="1"/>
-          <p:nvPr/>
+          <p:cNvSpPr>
+            <a:spLocks noGrp="1"/>
+          </p:cNvSpPr>
+          <p:nvPr>
+            <p:ph type="title"/>
+          </p:nvPr>
         </p:nvSpPr>
         <p:spPr>
           <a:xfrm>
-            <a:off x="336477" y="766934"/>
-            <a:ext cx="11550723" cy="5678606"/>
+            <a:off x="2636605" y="204786"/>
+            <a:ext cx="6918789" cy="952501"/>
           </a:xfrm>
-          <a:prstGeom prst="rect">
-            <a:avLst/>
-          </a:prstGeom>
-          <a:noFill/>
         </p:spPr>
         <p:txBody>
-          <a:bodyPr wrap="square">
-            <a:spAutoFit/>
-          </a:bodyPr>
+          <a:bodyPr/>
           <a:lstStyle/>
           <a:p>
-            <a:pPr marL="285750" indent="-285750" algn="just">
-              <a:lnSpc>
-                <a:spcPts val="2320"/>
-              </a:lnSpc>
-              <a:buFont typeface="Arial" panose="020B0604020202020204" pitchFamily="34" charset="0"/>
-              <a:buChar char="•"/>
-            </a:pPr>
-            <a:r>
-              <a:rPr lang="en-US" sz="1600" b="1" dirty="0" err="1">
-                <a:latin typeface="Arial" panose="020B0604020202020204" pitchFamily="34" charset="0"/>
-                <a:cs typeface="Arial" panose="020B0604020202020204" pitchFamily="34" charset="0"/>
-              </a:rPr>
-              <a:t>Команда</a:t>
-            </a:r>
-            <a:r>
-              <a:rPr lang="en-US" sz="1600" b="1" dirty="0">
-                <a:latin typeface="Arial" panose="020B0604020202020204" pitchFamily="34" charset="0"/>
-                <a:cs typeface="Arial" panose="020B0604020202020204" pitchFamily="34" charset="0"/>
-              </a:rPr>
-              <a:t> </a:t>
-            </a:r>
-            <a:r>
-              <a:rPr lang="en-US" sz="1600" b="1" dirty="0" err="1">
-                <a:latin typeface="Arial" panose="020B0604020202020204" pitchFamily="34" charset="0"/>
-                <a:cs typeface="Arial" panose="020B0604020202020204" pitchFamily="34" charset="0"/>
-              </a:rPr>
-              <a:t>из</a:t>
-            </a:r>
-            <a:r>
-              <a:rPr lang="en-US" sz="1600" b="1" dirty="0">
-                <a:latin typeface="Arial" panose="020B0604020202020204" pitchFamily="34" charset="0"/>
-                <a:cs typeface="Arial" panose="020B0604020202020204" pitchFamily="34" charset="0"/>
-              </a:rPr>
-              <a:t> 2-4 </a:t>
-            </a:r>
-            <a:r>
-              <a:rPr lang="en-US" sz="1600" b="1" dirty="0" err="1">
-                <a:latin typeface="Arial" panose="020B0604020202020204" pitchFamily="34" charset="0"/>
-                <a:cs typeface="Arial" panose="020B0604020202020204" pitchFamily="34" charset="0"/>
-              </a:rPr>
-              <a:t>человек</a:t>
-            </a:r>
-            <a:r>
-              <a:rPr lang="en-US" sz="1600" b="1" dirty="0">
-                <a:latin typeface="Arial" panose="020B0604020202020204" pitchFamily="34" charset="0"/>
-                <a:cs typeface="Arial" panose="020B0604020202020204" pitchFamily="34" charset="0"/>
-              </a:rPr>
-              <a:t> (</a:t>
-            </a:r>
-            <a:r>
-              <a:rPr lang="en-US" sz="1600" b="1" dirty="0" err="1">
-                <a:latin typeface="Arial" panose="020B0604020202020204" pitchFamily="34" charset="0"/>
-                <a:cs typeface="Arial" panose="020B0604020202020204" pitchFamily="34" charset="0"/>
-              </a:rPr>
-              <a:t>оптимально</a:t>
-            </a:r>
-            <a:r>
-              <a:rPr lang="en-US" sz="1600" b="1" dirty="0">
-                <a:latin typeface="Arial" panose="020B0604020202020204" pitchFamily="34" charset="0"/>
-                <a:cs typeface="Arial" panose="020B0604020202020204" pitchFamily="34" charset="0"/>
-              </a:rPr>
-              <a:t> – 3 </a:t>
-            </a:r>
-            <a:r>
-              <a:rPr lang="en-US" sz="1600" b="1" dirty="0" err="1">
-                <a:latin typeface="Arial" panose="020B0604020202020204" pitchFamily="34" charset="0"/>
-                <a:cs typeface="Arial" panose="020B0604020202020204" pitchFamily="34" charset="0"/>
-              </a:rPr>
-              <a:t>человека</a:t>
-            </a:r>
-            <a:r>
-              <a:rPr lang="en-US" sz="1600" b="1" dirty="0">
-                <a:latin typeface="Arial" panose="020B0604020202020204" pitchFamily="34" charset="0"/>
-                <a:cs typeface="Arial" panose="020B0604020202020204" pitchFamily="34" charset="0"/>
-              </a:rPr>
-              <a:t>) </a:t>
-            </a:r>
-          </a:p>
-          <a:p>
-            <a:pPr marL="742950" lvl="1" indent="-285750" algn="just">
-              <a:lnSpc>
-                <a:spcPts val="2320"/>
-              </a:lnSpc>
-              <a:buFont typeface="Arial" panose="020B0604020202020204" pitchFamily="34" charset="0"/>
-              <a:buChar char="•"/>
-            </a:pPr>
-            <a:r>
-              <a:rPr lang="en-US" sz="1600" dirty="0" err="1">
-                <a:latin typeface="Arial" panose="020B0604020202020204" pitchFamily="34" charset="0"/>
-                <a:cs typeface="Arial" panose="020B0604020202020204" pitchFamily="34" charset="0"/>
-              </a:rPr>
-              <a:t>Если</a:t>
-            </a:r>
-            <a:r>
-              <a:rPr lang="en-US" sz="1600" dirty="0">
-                <a:latin typeface="Arial" panose="020B0604020202020204" pitchFamily="34" charset="0"/>
-                <a:cs typeface="Arial" panose="020B0604020202020204" pitchFamily="34" charset="0"/>
-              </a:rPr>
-              <a:t> </a:t>
-            </a:r>
-            <a:r>
-              <a:rPr lang="en-US" sz="1600" dirty="0" err="1">
-                <a:latin typeface="Arial" panose="020B0604020202020204" pitchFamily="34" charset="0"/>
-                <a:cs typeface="Arial" panose="020B0604020202020204" pitchFamily="34" charset="0"/>
-              </a:rPr>
-              <a:t>не</a:t>
-            </a:r>
-            <a:r>
-              <a:rPr lang="en-US" sz="1600" dirty="0">
-                <a:latin typeface="Arial" panose="020B0604020202020204" pitchFamily="34" charset="0"/>
-                <a:cs typeface="Arial" panose="020B0604020202020204" pitchFamily="34" charset="0"/>
-              </a:rPr>
-              <a:t> </a:t>
-            </a:r>
-            <a:r>
-              <a:rPr lang="en-US" sz="1600" dirty="0" err="1">
-                <a:latin typeface="Arial" panose="020B0604020202020204" pitchFamily="34" charset="0"/>
-                <a:cs typeface="Arial" panose="020B0604020202020204" pitchFamily="34" charset="0"/>
-              </a:rPr>
-              <a:t>договоритесь</a:t>
-            </a:r>
-            <a:r>
-              <a:rPr lang="en-US" sz="1600" dirty="0">
-                <a:latin typeface="Arial" panose="020B0604020202020204" pitchFamily="34" charset="0"/>
-                <a:cs typeface="Arial" panose="020B0604020202020204" pitchFamily="34" charset="0"/>
-              </a:rPr>
-              <a:t>, </a:t>
-            </a:r>
-            <a:r>
-              <a:rPr lang="en-US" sz="1600" dirty="0" err="1">
-                <a:latin typeface="Arial" panose="020B0604020202020204" pitchFamily="34" charset="0"/>
-                <a:cs typeface="Arial" panose="020B0604020202020204" pitchFamily="34" charset="0"/>
-              </a:rPr>
-              <a:t>члены</a:t>
-            </a:r>
-            <a:r>
-              <a:rPr lang="en-US" sz="1600" dirty="0">
-                <a:latin typeface="Arial" panose="020B0604020202020204" pitchFamily="34" charset="0"/>
-                <a:cs typeface="Arial" panose="020B0604020202020204" pitchFamily="34" charset="0"/>
-              </a:rPr>
-              <a:t> </a:t>
-            </a:r>
-            <a:r>
-              <a:rPr lang="en-US" sz="1600" dirty="0" err="1">
-                <a:latin typeface="Arial" panose="020B0604020202020204" pitchFamily="34" charset="0"/>
-                <a:cs typeface="Arial" panose="020B0604020202020204" pitchFamily="34" charset="0"/>
-              </a:rPr>
-              <a:t>команды</a:t>
-            </a:r>
-            <a:r>
-              <a:rPr lang="en-US" sz="1600" dirty="0">
-                <a:latin typeface="Arial" panose="020B0604020202020204" pitchFamily="34" charset="0"/>
-                <a:cs typeface="Arial" panose="020B0604020202020204" pitchFamily="34" charset="0"/>
-              </a:rPr>
-              <a:t> </a:t>
-            </a:r>
-            <a:r>
-              <a:rPr lang="en-US" sz="1600" dirty="0" err="1">
-                <a:latin typeface="Arial" panose="020B0604020202020204" pitchFamily="34" charset="0"/>
-                <a:cs typeface="Arial" panose="020B0604020202020204" pitchFamily="34" charset="0"/>
-              </a:rPr>
-              <a:t>будут</a:t>
-            </a:r>
-            <a:r>
-              <a:rPr lang="en-US" sz="1600" dirty="0">
-                <a:latin typeface="Arial" panose="020B0604020202020204" pitchFamily="34" charset="0"/>
-                <a:cs typeface="Arial" panose="020B0604020202020204" pitchFamily="34" charset="0"/>
-              </a:rPr>
-              <a:t> </a:t>
-            </a:r>
-            <a:r>
-              <a:rPr lang="en-US" sz="1600" dirty="0" err="1">
-                <a:latin typeface="Arial" panose="020B0604020202020204" pitchFamily="34" charset="0"/>
-                <a:cs typeface="Arial" panose="020B0604020202020204" pitchFamily="34" charset="0"/>
-              </a:rPr>
-              <a:t>выбраны</a:t>
-            </a:r>
-            <a:r>
-              <a:rPr lang="en-US" sz="1600" dirty="0">
-                <a:latin typeface="Arial" panose="020B0604020202020204" pitchFamily="34" charset="0"/>
-                <a:cs typeface="Arial" panose="020B0604020202020204" pitchFamily="34" charset="0"/>
-              </a:rPr>
-              <a:t> </a:t>
-            </a:r>
-            <a:r>
-              <a:rPr lang="en-US" sz="1600" dirty="0" err="1">
-                <a:latin typeface="Arial" panose="020B0604020202020204" pitchFamily="34" charset="0"/>
-                <a:cs typeface="Arial" panose="020B0604020202020204" pitchFamily="34" charset="0"/>
-              </a:rPr>
-              <a:t>с</a:t>
-            </a:r>
-            <a:r>
-              <a:rPr lang="en-US" sz="1600" dirty="0">
-                <a:latin typeface="Arial" panose="020B0604020202020204" pitchFamily="34" charset="0"/>
-                <a:cs typeface="Arial" panose="020B0604020202020204" pitchFamily="34" charset="0"/>
-              </a:rPr>
-              <a:t> </a:t>
-            </a:r>
-            <a:r>
-              <a:rPr lang="en-US" sz="1600" dirty="0" err="1">
-                <a:latin typeface="Arial" panose="020B0604020202020204" pitchFamily="34" charset="0"/>
-                <a:cs typeface="Arial" panose="020B0604020202020204" pitchFamily="34" charset="0"/>
-              </a:rPr>
-              <a:t>помощью</a:t>
-            </a:r>
-            <a:r>
-              <a:rPr lang="en-US" sz="1600" dirty="0">
-                <a:latin typeface="Arial" panose="020B0604020202020204" pitchFamily="34" charset="0"/>
-                <a:cs typeface="Arial" panose="020B0604020202020204" pitchFamily="34" charset="0"/>
-              </a:rPr>
-              <a:t> </a:t>
-            </a:r>
-            <a:r>
-              <a:rPr lang="en-US" sz="1600" dirty="0" err="1">
-                <a:latin typeface="Arial" panose="020B0604020202020204" pitchFamily="34" charset="0"/>
-                <a:cs typeface="Arial" panose="020B0604020202020204" pitchFamily="34" charset="0"/>
-              </a:rPr>
-              <a:t>random.org</a:t>
-            </a:r>
-            <a:r>
-              <a:rPr lang="en-US" sz="1600" dirty="0">
-                <a:latin typeface="Arial" panose="020B0604020202020204" pitchFamily="34" charset="0"/>
-                <a:cs typeface="Arial" panose="020B0604020202020204" pitchFamily="34" charset="0"/>
-              </a:rPr>
-              <a:t> :)</a:t>
-            </a:r>
-          </a:p>
-          <a:p>
-            <a:pPr marL="285750" indent="-285750" algn="just">
-              <a:lnSpc>
-                <a:spcPts val="2320"/>
-              </a:lnSpc>
-              <a:buFont typeface="Arial" panose="020B0604020202020204" pitchFamily="34" charset="0"/>
-              <a:buChar char="•"/>
-            </a:pPr>
-            <a:r>
-              <a:rPr lang="en-US" sz="1600" dirty="0" err="1">
-                <a:latin typeface="Arial" panose="020B0604020202020204" pitchFamily="34" charset="0"/>
-                <a:cs typeface="Arial" panose="020B0604020202020204" pitchFamily="34" charset="0"/>
-              </a:rPr>
-              <a:t>Цель</a:t>
-            </a:r>
-            <a:r>
-              <a:rPr lang="en-US" sz="1600" dirty="0">
-                <a:latin typeface="Arial" panose="020B0604020202020204" pitchFamily="34" charset="0"/>
-                <a:cs typeface="Arial" panose="020B0604020202020204" pitchFamily="34" charset="0"/>
-              </a:rPr>
-              <a:t> – </a:t>
-            </a:r>
-            <a:r>
-              <a:rPr lang="en-US" sz="1600" dirty="0" err="1">
-                <a:latin typeface="Arial" panose="020B0604020202020204" pitchFamily="34" charset="0"/>
-                <a:cs typeface="Arial" panose="020B0604020202020204" pitchFamily="34" charset="0"/>
-              </a:rPr>
-              <a:t>сделать</a:t>
-            </a:r>
-            <a:r>
-              <a:rPr lang="en-US" sz="1600" dirty="0">
-                <a:latin typeface="Arial" panose="020B0604020202020204" pitchFamily="34" charset="0"/>
-                <a:cs typeface="Arial" panose="020B0604020202020204" pitchFamily="34" charset="0"/>
-              </a:rPr>
-              <a:t> </a:t>
-            </a:r>
-            <a:r>
-              <a:rPr lang="en-US" sz="1600" b="1" dirty="0" err="1">
-                <a:latin typeface="Arial" panose="020B0604020202020204" pitchFamily="34" charset="0"/>
-                <a:cs typeface="Arial" panose="020B0604020202020204" pitchFamily="34" charset="0"/>
-              </a:rPr>
-              <a:t>простой</a:t>
-            </a:r>
-            <a:r>
-              <a:rPr lang="en-US" sz="1600" b="1" dirty="0">
-                <a:latin typeface="Arial" panose="020B0604020202020204" pitchFamily="34" charset="0"/>
-                <a:cs typeface="Arial" panose="020B0604020202020204" pitchFamily="34" charset="0"/>
-              </a:rPr>
-              <a:t>, </a:t>
-            </a:r>
-            <a:r>
-              <a:rPr lang="en-US" sz="1600" b="1" dirty="0" err="1">
-                <a:latin typeface="Arial" panose="020B0604020202020204" pitchFamily="34" charset="0"/>
-                <a:cs typeface="Arial" panose="020B0604020202020204" pitchFamily="34" charset="0"/>
-              </a:rPr>
-              <a:t>но</a:t>
-            </a:r>
-            <a:r>
-              <a:rPr lang="en-US" sz="1600" b="1" dirty="0">
-                <a:latin typeface="Arial" panose="020B0604020202020204" pitchFamily="34" charset="0"/>
-                <a:cs typeface="Arial" panose="020B0604020202020204" pitchFamily="34" charset="0"/>
-              </a:rPr>
-              <a:t> </a:t>
-            </a:r>
-            <a:r>
-              <a:rPr lang="en-US" sz="1600" b="1" dirty="0" err="1">
-                <a:latin typeface="Arial" panose="020B0604020202020204" pitchFamily="34" charset="0"/>
-                <a:cs typeface="Arial" panose="020B0604020202020204" pitchFamily="34" charset="0"/>
-              </a:rPr>
-              <a:t>законченный</a:t>
-            </a:r>
-            <a:r>
-              <a:rPr lang="en-US" sz="1600" b="1" dirty="0">
-                <a:latin typeface="Arial" panose="020B0604020202020204" pitchFamily="34" charset="0"/>
-                <a:cs typeface="Arial" panose="020B0604020202020204" pitchFamily="34" charset="0"/>
-              </a:rPr>
-              <a:t> </a:t>
-            </a:r>
-            <a:r>
-              <a:rPr lang="en-US" sz="1600" b="1" dirty="0" err="1">
-                <a:latin typeface="Arial" panose="020B0604020202020204" pitchFamily="34" charset="0"/>
-                <a:cs typeface="Arial" panose="020B0604020202020204" pitchFamily="34" charset="0"/>
-              </a:rPr>
-              <a:t>продукт</a:t>
-            </a:r>
-            <a:r>
-              <a:rPr lang="en-US" sz="1600" b="1" dirty="0">
-                <a:latin typeface="Arial" panose="020B0604020202020204" pitchFamily="34" charset="0"/>
-                <a:cs typeface="Arial" panose="020B0604020202020204" pitchFamily="34" charset="0"/>
-              </a:rPr>
-              <a:t> </a:t>
-            </a:r>
-            <a:r>
-              <a:rPr lang="en-US" sz="1600" b="1" dirty="0" err="1">
-                <a:latin typeface="Arial" panose="020B0604020202020204" pitchFamily="34" charset="0"/>
-                <a:cs typeface="Arial" panose="020B0604020202020204" pitchFamily="34" charset="0"/>
-              </a:rPr>
-              <a:t>вида</a:t>
-            </a:r>
-            <a:r>
-              <a:rPr lang="en-US" sz="1600" dirty="0">
-                <a:latin typeface="Arial" panose="020B0604020202020204" pitchFamily="34" charset="0"/>
-                <a:cs typeface="Arial" panose="020B0604020202020204" pitchFamily="34" charset="0"/>
-              </a:rPr>
-              <a:t> «Java-</a:t>
-            </a:r>
-            <a:r>
-              <a:rPr lang="en-US" sz="1600" dirty="0" err="1">
-                <a:latin typeface="Arial" panose="020B0604020202020204" pitchFamily="34" charset="0"/>
-                <a:cs typeface="Arial" panose="020B0604020202020204" pitchFamily="34" charset="0"/>
-              </a:rPr>
-              <a:t>библиотека</a:t>
-            </a:r>
-            <a:r>
-              <a:rPr lang="en-US" sz="1600" dirty="0">
-                <a:latin typeface="Arial" panose="020B0604020202020204" pitchFamily="34" charset="0"/>
-                <a:cs typeface="Arial" panose="020B0604020202020204" pitchFamily="34" charset="0"/>
-              </a:rPr>
-              <a:t> + </a:t>
-            </a:r>
-            <a:r>
-              <a:rPr lang="en-US" sz="1600" b="1" dirty="0">
-                <a:latin typeface="Arial" panose="020B0604020202020204" pitchFamily="34" charset="0"/>
-                <a:cs typeface="Arial" panose="020B0604020202020204" pitchFamily="34" charset="0"/>
-              </a:rPr>
-              <a:t>CLI</a:t>
-            </a:r>
-            <a:r>
-              <a:rPr lang="en-US" sz="1600" dirty="0">
-                <a:latin typeface="Arial" panose="020B0604020202020204" pitchFamily="34" charset="0"/>
-                <a:cs typeface="Arial" panose="020B0604020202020204" pitchFamily="34" charset="0"/>
-              </a:rPr>
-              <a:t> </a:t>
-            </a:r>
-            <a:r>
-              <a:rPr lang="en-US" sz="1600" dirty="0" err="1">
-                <a:latin typeface="Arial" panose="020B0604020202020204" pitchFamily="34" charset="0"/>
-                <a:cs typeface="Arial" panose="020B0604020202020204" pitchFamily="34" charset="0"/>
-              </a:rPr>
-              <a:t>к</a:t>
-            </a:r>
-            <a:r>
-              <a:rPr lang="en-US" sz="1600" dirty="0">
-                <a:latin typeface="Arial" panose="020B0604020202020204" pitchFamily="34" charset="0"/>
-                <a:cs typeface="Arial" panose="020B0604020202020204" pitchFamily="34" charset="0"/>
-              </a:rPr>
-              <a:t> </a:t>
-            </a:r>
-            <a:r>
-              <a:rPr lang="en-US" sz="1600" dirty="0" err="1">
-                <a:latin typeface="Arial" panose="020B0604020202020204" pitchFamily="34" charset="0"/>
-                <a:cs typeface="Arial" panose="020B0604020202020204" pitchFamily="34" charset="0"/>
-              </a:rPr>
-              <a:t>ней</a:t>
-            </a:r>
-            <a:r>
-              <a:rPr lang="en-US" sz="1600" dirty="0">
-                <a:latin typeface="Arial" panose="020B0604020202020204" pitchFamily="34" charset="0"/>
-                <a:cs typeface="Arial" panose="020B0604020202020204" pitchFamily="34" charset="0"/>
-              </a:rPr>
-              <a:t>»</a:t>
-            </a:r>
-          </a:p>
-          <a:p>
-            <a:pPr marL="742950" lvl="1" indent="-285750" algn="just">
-              <a:lnSpc>
-                <a:spcPts val="2320"/>
-              </a:lnSpc>
-              <a:buFont typeface="Arial" panose="020B0604020202020204" pitchFamily="34" charset="0"/>
-              <a:buChar char="•"/>
-            </a:pPr>
-            <a:r>
-              <a:rPr lang="en-US" sz="1600" b="1" u="sng" dirty="0" err="1">
-                <a:latin typeface="Arial" panose="020B0604020202020204" pitchFamily="34" charset="0"/>
-                <a:cs typeface="Arial" panose="020B0604020202020204" pitchFamily="34" charset="0"/>
-              </a:rPr>
-              <a:t>Не</a:t>
-            </a:r>
-            <a:r>
-              <a:rPr lang="en-US" sz="1600" dirty="0">
-                <a:latin typeface="Arial" panose="020B0604020202020204" pitchFamily="34" charset="0"/>
-                <a:cs typeface="Arial" panose="020B0604020202020204" pitchFamily="34" charset="0"/>
-              </a:rPr>
-              <a:t> </a:t>
-            </a:r>
-            <a:r>
-              <a:rPr lang="en-US" sz="1600" dirty="0" err="1">
-                <a:latin typeface="Arial" panose="020B0604020202020204" pitchFamily="34" charset="0"/>
-                <a:cs typeface="Arial" panose="020B0604020202020204" pitchFamily="34" charset="0"/>
-              </a:rPr>
-              <a:t>мобильное</a:t>
-            </a:r>
-            <a:r>
-              <a:rPr lang="en-US" sz="1600" dirty="0">
-                <a:latin typeface="Arial" panose="020B0604020202020204" pitchFamily="34" charset="0"/>
-                <a:cs typeface="Arial" panose="020B0604020202020204" pitchFamily="34" charset="0"/>
-              </a:rPr>
-              <a:t> </a:t>
-            </a:r>
-            <a:r>
-              <a:rPr lang="en-US" sz="1600" dirty="0" err="1">
-                <a:latin typeface="Arial" panose="020B0604020202020204" pitchFamily="34" charset="0"/>
-                <a:cs typeface="Arial" panose="020B0604020202020204" pitchFamily="34" charset="0"/>
-              </a:rPr>
-              <a:t>и</a:t>
-            </a:r>
-            <a:r>
-              <a:rPr lang="en-US" sz="1600" dirty="0">
-                <a:latin typeface="Arial" panose="020B0604020202020204" pitchFamily="34" charset="0"/>
-                <a:cs typeface="Arial" panose="020B0604020202020204" pitchFamily="34" charset="0"/>
-              </a:rPr>
-              <a:t> </a:t>
-            </a:r>
-            <a:r>
-              <a:rPr lang="en-US" sz="1600" b="1" u="sng" dirty="0" err="1">
-                <a:latin typeface="Arial" panose="020B0604020202020204" pitchFamily="34" charset="0"/>
-                <a:cs typeface="Arial" panose="020B0604020202020204" pitchFamily="34" charset="0"/>
-              </a:rPr>
-              <a:t>не</a:t>
-            </a:r>
-            <a:r>
-              <a:rPr lang="en-US" sz="1600" dirty="0">
-                <a:latin typeface="Arial" panose="020B0604020202020204" pitchFamily="34" charset="0"/>
-                <a:cs typeface="Arial" panose="020B0604020202020204" pitchFamily="34" charset="0"/>
-              </a:rPr>
-              <a:t> </a:t>
-            </a:r>
-            <a:r>
-              <a:rPr lang="en-US" sz="1600" dirty="0" err="1">
-                <a:latin typeface="Arial" panose="020B0604020202020204" pitchFamily="34" charset="0"/>
-                <a:cs typeface="Arial" panose="020B0604020202020204" pitchFamily="34" charset="0"/>
-              </a:rPr>
-              <a:t>веб-приложение</a:t>
-            </a:r>
-            <a:endParaRPr lang="en-US" sz="1600" dirty="0">
+            <a:pPr algn="ctr"/>
+            <a:r>
+              <a:rPr lang="ru-RU" b="1" dirty="0">
+                <a:latin typeface="Arial" panose="020B0604020202020204" pitchFamily="34" charset="0"/>
+                <a:cs typeface="Arial" panose="020B0604020202020204" pitchFamily="34" charset="0"/>
+              </a:rPr>
+              <a:t>Командный проект (2)</a:t>
+            </a:r>
+            <a:endParaRPr lang="en-US" b="1" dirty="0">
               <a:latin typeface="Arial" panose="020B0604020202020204" pitchFamily="34" charset="0"/>
               <a:cs typeface="Arial" panose="020B0604020202020204" pitchFamily="34" charset="0"/>
             </a:endParaRPr>
-          </a:p>
-          <a:p>
-            <a:pPr marL="742950" lvl="1" indent="-285750" algn="just">
-              <a:lnSpc>
-                <a:spcPts val="2320"/>
-              </a:lnSpc>
-              <a:buFont typeface="Arial" panose="020B0604020202020204" pitchFamily="34" charset="0"/>
-              <a:buChar char="•"/>
-            </a:pPr>
-            <a:r>
-              <a:rPr lang="en-US" sz="1600" dirty="0" err="1">
-                <a:latin typeface="Arial" panose="020B0604020202020204" pitchFamily="34" charset="0"/>
-                <a:cs typeface="Arial" panose="020B0604020202020204" pitchFamily="34" charset="0"/>
-              </a:rPr>
-              <a:t>Идеи</a:t>
-            </a:r>
-            <a:r>
-              <a:rPr lang="en-US" sz="1600" dirty="0">
-                <a:latin typeface="Arial" panose="020B0604020202020204" pitchFamily="34" charset="0"/>
-                <a:cs typeface="Arial" panose="020B0604020202020204" pitchFamily="34" charset="0"/>
-              </a:rPr>
-              <a:t> </a:t>
-            </a:r>
-            <a:r>
-              <a:rPr lang="en-US" sz="1600" dirty="0" err="1">
-                <a:latin typeface="Arial" panose="020B0604020202020204" pitchFamily="34" charset="0"/>
-                <a:cs typeface="Arial" panose="020B0604020202020204" pitchFamily="34" charset="0"/>
-              </a:rPr>
-              <a:t>проектов</a:t>
-            </a:r>
-            <a:r>
-              <a:rPr lang="en-US" sz="1600" dirty="0">
-                <a:latin typeface="Arial" panose="020B0604020202020204" pitchFamily="34" charset="0"/>
-                <a:cs typeface="Arial" panose="020B0604020202020204" pitchFamily="34" charset="0"/>
-              </a:rPr>
-              <a:t> (</a:t>
-            </a:r>
-            <a:r>
-              <a:rPr lang="en-US" sz="1600" dirty="0" err="1">
-                <a:latin typeface="Arial" panose="020B0604020202020204" pitchFamily="34" charset="0"/>
-                <a:cs typeface="Arial" panose="020B0604020202020204" pitchFamily="34" charset="0"/>
-              </a:rPr>
-              <a:t>можно</a:t>
-            </a:r>
-            <a:r>
-              <a:rPr lang="en-US" sz="1600" dirty="0">
-                <a:latin typeface="Arial" panose="020B0604020202020204" pitchFamily="34" charset="0"/>
-                <a:cs typeface="Arial" panose="020B0604020202020204" pitchFamily="34" charset="0"/>
-              </a:rPr>
-              <a:t> </a:t>
-            </a:r>
-            <a:r>
-              <a:rPr lang="en-US" sz="1600" dirty="0" err="1">
-                <a:latin typeface="Arial" panose="020B0604020202020204" pitchFamily="34" charset="0"/>
-                <a:cs typeface="Arial" panose="020B0604020202020204" pitchFamily="34" charset="0"/>
-              </a:rPr>
-              <a:t>взять</a:t>
-            </a:r>
-            <a:r>
-              <a:rPr lang="en-US" sz="1600" dirty="0">
-                <a:latin typeface="Arial" panose="020B0604020202020204" pitchFamily="34" charset="0"/>
-                <a:cs typeface="Arial" panose="020B0604020202020204" pitchFamily="34" charset="0"/>
-              </a:rPr>
-              <a:t> </a:t>
-            </a:r>
-            <a:r>
-              <a:rPr lang="en-US" sz="1600" dirty="0" err="1">
-                <a:latin typeface="Arial" panose="020B0604020202020204" pitchFamily="34" charset="0"/>
-                <a:cs typeface="Arial" panose="020B0604020202020204" pitchFamily="34" charset="0"/>
-              </a:rPr>
-              <a:t>свою</a:t>
-            </a:r>
-            <a:r>
-              <a:rPr lang="en-US" sz="1600" dirty="0">
-                <a:latin typeface="Arial" panose="020B0604020202020204" pitchFamily="34" charset="0"/>
-                <a:cs typeface="Arial" panose="020B0604020202020204" pitchFamily="34" charset="0"/>
-              </a:rPr>
-              <a:t>): </a:t>
-            </a:r>
-            <a:r>
-              <a:rPr lang="en-US" sz="1600" dirty="0">
-                <a:latin typeface="Arial" panose="020B0604020202020204" pitchFamily="34" charset="0"/>
-                <a:cs typeface="Arial" panose="020B0604020202020204" pitchFamily="34" charset="0"/>
-                <a:hlinkClick r:id="rId3"/>
-              </a:rPr>
-              <a:t>https://github.com/nvamelichev/hse-java-spring-2022/blob/main/project-ideas.md</a:t>
-            </a:r>
-            <a:r>
-              <a:rPr lang="en-US" sz="1600" dirty="0">
-                <a:latin typeface="Arial" panose="020B0604020202020204" pitchFamily="34" charset="0"/>
-                <a:cs typeface="Arial" panose="020B0604020202020204" pitchFamily="34" charset="0"/>
-              </a:rPr>
-              <a:t> </a:t>
-            </a:r>
-          </a:p>
-          <a:p>
-            <a:pPr marL="285750" indent="-285750" algn="just">
-              <a:lnSpc>
-                <a:spcPts val="2320"/>
-              </a:lnSpc>
-              <a:buFont typeface="Arial" panose="020B0604020202020204" pitchFamily="34" charset="0"/>
-              <a:buChar char="•"/>
-            </a:pPr>
-            <a:r>
-              <a:rPr lang="en-US" sz="1600" b="1" dirty="0" err="1">
-                <a:latin typeface="Arial" panose="020B0604020202020204" pitchFamily="34" charset="0"/>
-                <a:cs typeface="Arial" panose="020B0604020202020204" pitchFamily="34" charset="0"/>
-              </a:rPr>
-              <a:t>Итеративная</a:t>
-            </a:r>
-            <a:r>
-              <a:rPr lang="en-US" sz="1600" b="1" dirty="0">
-                <a:latin typeface="Arial" panose="020B0604020202020204" pitchFamily="34" charset="0"/>
-                <a:cs typeface="Arial" panose="020B0604020202020204" pitchFamily="34" charset="0"/>
-              </a:rPr>
-              <a:t>, </a:t>
-            </a:r>
-            <a:r>
-              <a:rPr lang="en-US" sz="1600" b="1" dirty="0" err="1">
-                <a:latin typeface="Arial" panose="020B0604020202020204" pitchFamily="34" charset="0"/>
-                <a:cs typeface="Arial" panose="020B0604020202020204" pitchFamily="34" charset="0"/>
-              </a:rPr>
-              <a:t>гибкая</a:t>
-            </a:r>
-            <a:r>
-              <a:rPr lang="en-US" sz="1600" b="1" dirty="0">
-                <a:latin typeface="Arial" panose="020B0604020202020204" pitchFamily="34" charset="0"/>
-                <a:cs typeface="Arial" panose="020B0604020202020204" pitchFamily="34" charset="0"/>
-              </a:rPr>
-              <a:t> (Agile)</a:t>
-            </a:r>
-            <a:r>
-              <a:rPr lang="en-US" sz="1600" dirty="0">
-                <a:latin typeface="Arial" panose="020B0604020202020204" pitchFamily="34" charset="0"/>
-                <a:cs typeface="Arial" panose="020B0604020202020204" pitchFamily="34" charset="0"/>
-              </a:rPr>
-              <a:t> </a:t>
-            </a:r>
-            <a:r>
-              <a:rPr lang="en-US" sz="1600" dirty="0" err="1">
-                <a:latin typeface="Arial" panose="020B0604020202020204" pitchFamily="34" charset="0"/>
-                <a:cs typeface="Arial" panose="020B0604020202020204" pitchFamily="34" charset="0"/>
-              </a:rPr>
-              <a:t>разработка</a:t>
-            </a:r>
-            <a:r>
-              <a:rPr lang="en-US" sz="1600" dirty="0">
-                <a:latin typeface="Arial" panose="020B0604020202020204" pitchFamily="34" charset="0"/>
-                <a:cs typeface="Arial" panose="020B0604020202020204" pitchFamily="34" charset="0"/>
-              </a:rPr>
-              <a:t> + Deadline Driven Development</a:t>
-            </a:r>
-          </a:p>
-          <a:p>
-            <a:pPr marL="742950" lvl="1" indent="-285750" algn="just">
-              <a:lnSpc>
-                <a:spcPts val="2320"/>
-              </a:lnSpc>
-              <a:buFont typeface="Arial" panose="020B0604020202020204" pitchFamily="34" charset="0"/>
-              <a:buChar char="•"/>
-            </a:pPr>
-            <a:r>
-              <a:rPr lang="en-US" sz="1400" dirty="0" err="1">
-                <a:latin typeface="Arial" panose="020B0604020202020204" pitchFamily="34" charset="0"/>
-                <a:cs typeface="Arial" panose="020B0604020202020204" pitchFamily="34" charset="0"/>
-              </a:rPr>
-              <a:t>Преподаватель</a:t>
-            </a:r>
-            <a:r>
-              <a:rPr lang="en-US" sz="1400" dirty="0">
-                <a:latin typeface="Arial" panose="020B0604020202020204" pitchFamily="34" charset="0"/>
-                <a:cs typeface="Arial" panose="020B0604020202020204" pitchFamily="34" charset="0"/>
-              </a:rPr>
-              <a:t> – </a:t>
-            </a:r>
-            <a:r>
-              <a:rPr lang="en-US" sz="1400" dirty="0" err="1">
-                <a:latin typeface="Arial" panose="020B0604020202020204" pitchFamily="34" charset="0"/>
-                <a:cs typeface="Arial" panose="020B0604020202020204" pitchFamily="34" charset="0"/>
-              </a:rPr>
-              <a:t>в</a:t>
-            </a:r>
-            <a:r>
-              <a:rPr lang="en-US" sz="1400" dirty="0">
-                <a:latin typeface="Arial" panose="020B0604020202020204" pitchFamily="34" charset="0"/>
-                <a:cs typeface="Arial" panose="020B0604020202020204" pitchFamily="34" charset="0"/>
-              </a:rPr>
-              <a:t> </a:t>
-            </a:r>
-            <a:r>
-              <a:rPr lang="en-US" sz="1400" dirty="0" err="1">
-                <a:latin typeface="Arial" panose="020B0604020202020204" pitchFamily="34" charset="0"/>
-                <a:cs typeface="Arial" panose="020B0604020202020204" pitchFamily="34" charset="0"/>
-              </a:rPr>
-              <a:t>роли</a:t>
-            </a:r>
-            <a:r>
-              <a:rPr lang="en-US" sz="1400" dirty="0">
-                <a:latin typeface="Arial" panose="020B0604020202020204" pitchFamily="34" charset="0"/>
-                <a:cs typeface="Arial" panose="020B0604020202020204" pitchFamily="34" charset="0"/>
-              </a:rPr>
-              <a:t> </a:t>
-            </a:r>
-            <a:r>
-              <a:rPr lang="en-US" sz="1400" b="1" dirty="0">
-                <a:latin typeface="Arial" panose="020B0604020202020204" pitchFamily="34" charset="0"/>
-                <a:cs typeface="Arial" panose="020B0604020202020204" pitchFamily="34" charset="0"/>
-              </a:rPr>
-              <a:t>Product Owner </a:t>
-            </a:r>
-            <a:r>
-              <a:rPr lang="en-US" sz="1400" dirty="0">
-                <a:latin typeface="Arial" panose="020B0604020202020204" pitchFamily="34" charset="0"/>
-                <a:cs typeface="Arial" panose="020B0604020202020204" pitchFamily="34" charset="0"/>
-              </a:rPr>
-              <a:t>(«</a:t>
-            </a:r>
-            <a:r>
-              <a:rPr lang="en-US" sz="1400" dirty="0" err="1">
-                <a:latin typeface="Arial" panose="020B0604020202020204" pitchFamily="34" charset="0"/>
-                <a:cs typeface="Arial" panose="020B0604020202020204" pitchFamily="34" charset="0"/>
-              </a:rPr>
-              <a:t>владельца</a:t>
-            </a:r>
-            <a:r>
-              <a:rPr lang="en-US" sz="1400" dirty="0">
-                <a:latin typeface="Arial" panose="020B0604020202020204" pitchFamily="34" charset="0"/>
-                <a:cs typeface="Arial" panose="020B0604020202020204" pitchFamily="34" charset="0"/>
-              </a:rPr>
-              <a:t> </a:t>
-            </a:r>
-            <a:r>
-              <a:rPr lang="en-US" sz="1400" dirty="0" err="1">
-                <a:latin typeface="Arial" panose="020B0604020202020204" pitchFamily="34" charset="0"/>
-                <a:cs typeface="Arial" panose="020B0604020202020204" pitchFamily="34" charset="0"/>
-              </a:rPr>
-              <a:t>продукта</a:t>
-            </a:r>
-            <a:r>
-              <a:rPr lang="en-US" sz="1400" dirty="0">
-                <a:latin typeface="Arial" panose="020B0604020202020204" pitchFamily="34" charset="0"/>
-                <a:cs typeface="Arial" panose="020B0604020202020204" pitchFamily="34" charset="0"/>
-              </a:rPr>
-              <a:t>») </a:t>
-            </a:r>
-            <a:r>
-              <a:rPr lang="en-US" sz="1400" dirty="0" err="1">
-                <a:latin typeface="Arial" panose="020B0604020202020204" pitchFamily="34" charset="0"/>
-                <a:cs typeface="Arial" panose="020B0604020202020204" pitchFamily="34" charset="0"/>
-              </a:rPr>
-              <a:t>и</a:t>
-            </a:r>
-            <a:r>
-              <a:rPr lang="en-US" sz="1400" dirty="0">
-                <a:latin typeface="Arial" panose="020B0604020202020204" pitchFamily="34" charset="0"/>
-                <a:cs typeface="Arial" panose="020B0604020202020204" pitchFamily="34" charset="0"/>
-              </a:rPr>
-              <a:t> </a:t>
-            </a:r>
-            <a:r>
-              <a:rPr lang="en-US" sz="1400" b="1" dirty="0" err="1">
-                <a:latin typeface="Arial" panose="020B0604020202020204" pitchFamily="34" charset="0"/>
-                <a:cs typeface="Arial" panose="020B0604020202020204" pitchFamily="34" charset="0"/>
-              </a:rPr>
-              <a:t>заказчика</a:t>
-            </a:r>
-            <a:endParaRPr lang="en-US" sz="1400" b="1" dirty="0">
-              <a:latin typeface="Arial" panose="020B0604020202020204" pitchFamily="34" charset="0"/>
-              <a:cs typeface="Arial" panose="020B0604020202020204" pitchFamily="34" charset="0"/>
-            </a:endParaRPr>
-          </a:p>
-          <a:p>
-            <a:pPr marL="742950" lvl="1" indent="-285750" algn="just">
-              <a:lnSpc>
-                <a:spcPts val="2320"/>
-              </a:lnSpc>
-              <a:buFont typeface="Arial" panose="020B0604020202020204" pitchFamily="34" charset="0"/>
-              <a:buChar char="•"/>
-            </a:pPr>
-            <a:r>
-              <a:rPr lang="en-US" sz="1400" dirty="0" err="1">
-                <a:latin typeface="Arial" panose="020B0604020202020204" pitchFamily="34" charset="0"/>
-                <a:cs typeface="Arial" panose="020B0604020202020204" pitchFamily="34" charset="0"/>
-              </a:rPr>
-              <a:t>Утверждает</a:t>
-            </a:r>
-            <a:r>
-              <a:rPr lang="en-US" sz="1400" dirty="0">
-                <a:latin typeface="Arial" panose="020B0604020202020204" pitchFamily="34" charset="0"/>
-                <a:cs typeface="Arial" panose="020B0604020202020204" pitchFamily="34" charset="0"/>
-              </a:rPr>
-              <a:t> </a:t>
-            </a:r>
-            <a:r>
-              <a:rPr lang="en-US" sz="1400" dirty="0" err="1">
-                <a:latin typeface="Arial" panose="020B0604020202020204" pitchFamily="34" charset="0"/>
-                <a:cs typeface="Arial" panose="020B0604020202020204" pitchFamily="34" charset="0"/>
-              </a:rPr>
-              <a:t>вашу</a:t>
-            </a:r>
-            <a:r>
-              <a:rPr lang="en-US" sz="1400" dirty="0">
-                <a:latin typeface="Arial" panose="020B0604020202020204" pitchFamily="34" charset="0"/>
-                <a:cs typeface="Arial" panose="020B0604020202020204" pitchFamily="34" charset="0"/>
-              </a:rPr>
-              <a:t> </a:t>
-            </a:r>
-            <a:r>
-              <a:rPr lang="en-US" sz="1400" dirty="0" err="1">
-                <a:latin typeface="Arial" panose="020B0604020202020204" pitchFamily="34" charset="0"/>
-                <a:cs typeface="Arial" panose="020B0604020202020204" pitchFamily="34" charset="0"/>
-              </a:rPr>
-              <a:t>идею</a:t>
-            </a:r>
-            <a:r>
-              <a:rPr lang="en-US" sz="1400" dirty="0">
-                <a:latin typeface="Arial" panose="020B0604020202020204" pitchFamily="34" charset="0"/>
-                <a:cs typeface="Arial" panose="020B0604020202020204" pitchFamily="34" charset="0"/>
-              </a:rPr>
-              <a:t>, </a:t>
-            </a:r>
-            <a:r>
-              <a:rPr lang="en-US" sz="1400" dirty="0" err="1">
-                <a:latin typeface="Arial" panose="020B0604020202020204" pitchFamily="34" charset="0"/>
-                <a:cs typeface="Arial" panose="020B0604020202020204" pitchFamily="34" charset="0"/>
-              </a:rPr>
-              <a:t>смотрит</a:t>
-            </a:r>
-            <a:r>
-              <a:rPr lang="en-US" sz="1400" dirty="0">
-                <a:latin typeface="Arial" panose="020B0604020202020204" pitchFamily="34" charset="0"/>
-                <a:cs typeface="Arial" panose="020B0604020202020204" pitchFamily="34" charset="0"/>
-              </a:rPr>
-              <a:t> </a:t>
-            </a:r>
-            <a:r>
-              <a:rPr lang="en-US" sz="1400" dirty="0" err="1">
-                <a:latin typeface="Arial" panose="020B0604020202020204" pitchFamily="34" charset="0"/>
-                <a:cs typeface="Arial" panose="020B0604020202020204" pitchFamily="34" charset="0"/>
-              </a:rPr>
-              <a:t>демки</a:t>
-            </a:r>
-            <a:r>
-              <a:rPr lang="en-US" sz="1400" dirty="0">
-                <a:latin typeface="Arial" panose="020B0604020202020204" pitchFamily="34" charset="0"/>
-                <a:cs typeface="Arial" panose="020B0604020202020204" pitchFamily="34" charset="0"/>
-              </a:rPr>
-              <a:t>, </a:t>
-            </a:r>
-            <a:r>
-              <a:rPr lang="en-US" sz="1400" dirty="0" err="1">
-                <a:latin typeface="Arial" panose="020B0604020202020204" pitchFamily="34" charset="0"/>
-                <a:cs typeface="Arial" panose="020B0604020202020204" pitchFamily="34" charset="0"/>
-              </a:rPr>
-              <a:t>задаёт</a:t>
-            </a:r>
-            <a:r>
-              <a:rPr lang="en-US" sz="1400" dirty="0">
-                <a:latin typeface="Arial" panose="020B0604020202020204" pitchFamily="34" charset="0"/>
-                <a:cs typeface="Arial" panose="020B0604020202020204" pitchFamily="34" charset="0"/>
-              </a:rPr>
-              <a:t> </a:t>
-            </a:r>
-            <a:r>
-              <a:rPr lang="en-US" sz="1400" dirty="0" err="1">
-                <a:latin typeface="Arial" panose="020B0604020202020204" pitchFamily="34" charset="0"/>
-                <a:cs typeface="Arial" panose="020B0604020202020204" pitchFamily="34" charset="0"/>
-              </a:rPr>
-              <a:t>вопросы</a:t>
-            </a:r>
-            <a:r>
-              <a:rPr lang="en-US" sz="1400" dirty="0">
-                <a:latin typeface="Arial" panose="020B0604020202020204" pitchFamily="34" charset="0"/>
-                <a:cs typeface="Arial" panose="020B0604020202020204" pitchFamily="34" charset="0"/>
-              </a:rPr>
-              <a:t>, </a:t>
-            </a:r>
-            <a:r>
-              <a:rPr lang="en-US" sz="1400" dirty="0" err="1">
-                <a:latin typeface="Arial" panose="020B0604020202020204" pitchFamily="34" charset="0"/>
-                <a:cs typeface="Arial" panose="020B0604020202020204" pitchFamily="34" charset="0"/>
-              </a:rPr>
-              <a:t>предлагает</a:t>
-            </a:r>
-            <a:r>
-              <a:rPr lang="en-US" sz="1400" dirty="0">
-                <a:latin typeface="Arial" panose="020B0604020202020204" pitchFamily="34" charset="0"/>
-                <a:cs typeface="Arial" panose="020B0604020202020204" pitchFamily="34" charset="0"/>
-              </a:rPr>
-              <a:t> </a:t>
-            </a:r>
-            <a:r>
-              <a:rPr lang="en-US" sz="1400" dirty="0" err="1">
-                <a:latin typeface="Arial" panose="020B0604020202020204" pitchFamily="34" charset="0"/>
-                <a:cs typeface="Arial" panose="020B0604020202020204" pitchFamily="34" charset="0"/>
-              </a:rPr>
-              <a:t>варианты</a:t>
-            </a:r>
-            <a:r>
-              <a:rPr lang="en-US" sz="1400" dirty="0">
-                <a:latin typeface="Arial" panose="020B0604020202020204" pitchFamily="34" charset="0"/>
-                <a:cs typeface="Arial" panose="020B0604020202020204" pitchFamily="34" charset="0"/>
-              </a:rPr>
-              <a:t> </a:t>
-            </a:r>
-            <a:r>
-              <a:rPr lang="en-US" sz="1400" dirty="0" err="1">
-                <a:latin typeface="Arial" panose="020B0604020202020204" pitchFamily="34" charset="0"/>
-                <a:cs typeface="Arial" panose="020B0604020202020204" pitchFamily="34" charset="0"/>
-              </a:rPr>
-              <a:t>развития</a:t>
-            </a:r>
-            <a:r>
-              <a:rPr lang="en-US" sz="1400" dirty="0">
-                <a:latin typeface="Arial" panose="020B0604020202020204" pitchFamily="34" charset="0"/>
-                <a:cs typeface="Arial" panose="020B0604020202020204" pitchFamily="34" charset="0"/>
-              </a:rPr>
-              <a:t> </a:t>
-            </a:r>
-            <a:r>
-              <a:rPr lang="en-US" sz="1400" dirty="0" err="1">
-                <a:latin typeface="Arial" panose="020B0604020202020204" pitchFamily="34" charset="0"/>
-                <a:cs typeface="Arial" panose="020B0604020202020204" pitchFamily="34" charset="0"/>
-              </a:rPr>
-              <a:t>проекта</a:t>
-            </a:r>
-            <a:r>
-              <a:rPr lang="en-US" sz="1400" dirty="0">
-                <a:latin typeface="Arial" panose="020B0604020202020204" pitchFamily="34" charset="0"/>
-                <a:cs typeface="Arial" panose="020B0604020202020204" pitchFamily="34" charset="0"/>
-              </a:rPr>
-              <a:t> </a:t>
-            </a:r>
-          </a:p>
-          <a:p>
-            <a:pPr marL="742950" lvl="1" indent="-285750" algn="just">
-              <a:lnSpc>
-                <a:spcPts val="2320"/>
-              </a:lnSpc>
-              <a:buFont typeface="Arial" panose="020B0604020202020204" pitchFamily="34" charset="0"/>
-              <a:buChar char="•"/>
-            </a:pPr>
-            <a:r>
-              <a:rPr lang="en-US" sz="1400" b="1" dirty="0" err="1">
-                <a:latin typeface="Arial" panose="020B0604020202020204" pitchFamily="34" charset="0"/>
-                <a:cs typeface="Arial" panose="020B0604020202020204" pitchFamily="34" charset="0"/>
-              </a:rPr>
-              <a:t>Может</a:t>
-            </a:r>
-            <a:r>
-              <a:rPr lang="en-US" sz="1400" b="1" dirty="0">
-                <a:latin typeface="Arial" panose="020B0604020202020204" pitchFamily="34" charset="0"/>
-                <a:cs typeface="Arial" panose="020B0604020202020204" pitchFamily="34" charset="0"/>
-              </a:rPr>
-              <a:t> (</a:t>
-            </a:r>
-            <a:r>
-              <a:rPr lang="en-US" sz="1400" b="1" dirty="0" err="1">
-                <a:latin typeface="Arial" panose="020B0604020202020204" pitchFamily="34" charset="0"/>
-                <a:cs typeface="Arial" panose="020B0604020202020204" pitchFamily="34" charset="0"/>
-              </a:rPr>
-              <a:t>и</a:t>
-            </a:r>
-            <a:r>
-              <a:rPr lang="en-US" sz="1400" b="1" dirty="0">
-                <a:latin typeface="Arial" panose="020B0604020202020204" pitchFamily="34" charset="0"/>
-                <a:cs typeface="Arial" panose="020B0604020202020204" pitchFamily="34" charset="0"/>
-              </a:rPr>
-              <a:t> </a:t>
-            </a:r>
-            <a:r>
-              <a:rPr lang="en-US" sz="1400" b="1" dirty="0" err="1">
-                <a:latin typeface="Arial" panose="020B0604020202020204" pitchFamily="34" charset="0"/>
-                <a:cs typeface="Arial" panose="020B0604020202020204" pitchFamily="34" charset="0"/>
-              </a:rPr>
-              <a:t>будет</a:t>
-            </a:r>
-            <a:r>
-              <a:rPr lang="en-US" sz="1400" b="1" dirty="0">
-                <a:latin typeface="Arial" panose="020B0604020202020204" pitchFamily="34" charset="0"/>
-                <a:cs typeface="Arial" panose="020B0604020202020204" pitchFamily="34" charset="0"/>
-              </a:rPr>
-              <a:t>!)</a:t>
-            </a:r>
-            <a:r>
-              <a:rPr lang="en-US" sz="1400" dirty="0">
-                <a:latin typeface="Arial" panose="020B0604020202020204" pitchFamily="34" charset="0"/>
-                <a:cs typeface="Arial" panose="020B0604020202020204" pitchFamily="34" charset="0"/>
-              </a:rPr>
-              <a:t> </a:t>
-            </a:r>
-            <a:r>
-              <a:rPr lang="en-US" sz="1400" b="1" dirty="0" err="1">
-                <a:latin typeface="Arial" panose="020B0604020202020204" pitchFamily="34" charset="0"/>
-                <a:cs typeface="Arial" panose="020B0604020202020204" pitchFamily="34" charset="0"/>
-              </a:rPr>
-              <a:t>менять</a:t>
-            </a:r>
-            <a:r>
-              <a:rPr lang="en-US" sz="1400" b="1" dirty="0">
-                <a:latin typeface="Arial" panose="020B0604020202020204" pitchFamily="34" charset="0"/>
-                <a:cs typeface="Arial" panose="020B0604020202020204" pitchFamily="34" charset="0"/>
-              </a:rPr>
-              <a:t> </a:t>
-            </a:r>
-            <a:r>
-              <a:rPr lang="en-US" sz="1400" b="1" dirty="0" err="1">
-                <a:latin typeface="Arial" panose="020B0604020202020204" pitchFamily="34" charset="0"/>
-                <a:cs typeface="Arial" panose="020B0604020202020204" pitchFamily="34" charset="0"/>
-              </a:rPr>
-              <a:t>требования</a:t>
-            </a:r>
-            <a:r>
-              <a:rPr lang="en-US" sz="1400" b="1" dirty="0">
-                <a:latin typeface="Arial" panose="020B0604020202020204" pitchFamily="34" charset="0"/>
-                <a:cs typeface="Arial" panose="020B0604020202020204" pitchFamily="34" charset="0"/>
-              </a:rPr>
-              <a:t> </a:t>
-            </a:r>
-            <a:r>
-              <a:rPr lang="en-US" sz="1400" dirty="0" err="1">
-                <a:latin typeface="Arial" panose="020B0604020202020204" pitchFamily="34" charset="0"/>
-                <a:cs typeface="Arial" panose="020B0604020202020204" pitchFamily="34" charset="0"/>
-              </a:rPr>
-              <a:t>во</a:t>
-            </a:r>
-            <a:r>
-              <a:rPr lang="en-US" sz="1400" dirty="0">
-                <a:latin typeface="Arial" panose="020B0604020202020204" pitchFamily="34" charset="0"/>
-                <a:cs typeface="Arial" panose="020B0604020202020204" pitchFamily="34" charset="0"/>
-              </a:rPr>
-              <a:t> </a:t>
-            </a:r>
-            <a:r>
-              <a:rPr lang="en-US" sz="1400" dirty="0" err="1">
-                <a:latin typeface="Arial" panose="020B0604020202020204" pitchFamily="34" charset="0"/>
-                <a:cs typeface="Arial" panose="020B0604020202020204" pitchFamily="34" charset="0"/>
-              </a:rPr>
-              <a:t>время</a:t>
-            </a:r>
-            <a:r>
-              <a:rPr lang="en-US" sz="1400" dirty="0">
-                <a:latin typeface="Arial" panose="020B0604020202020204" pitchFamily="34" charset="0"/>
-                <a:cs typeface="Arial" panose="020B0604020202020204" pitchFamily="34" charset="0"/>
-              </a:rPr>
-              <a:t> </a:t>
-            </a:r>
-            <a:r>
-              <a:rPr lang="en-US" sz="1400" dirty="0" err="1">
-                <a:latin typeface="Arial" panose="020B0604020202020204" pitchFamily="34" charset="0"/>
-                <a:cs typeface="Arial" panose="020B0604020202020204" pitchFamily="34" charset="0"/>
-              </a:rPr>
-              <a:t>разработки</a:t>
-            </a:r>
-            <a:r>
-              <a:rPr lang="en-US" sz="1400" dirty="0">
-                <a:latin typeface="Arial" panose="020B0604020202020204" pitchFamily="34" charset="0"/>
-                <a:cs typeface="Arial" panose="020B0604020202020204" pitchFamily="34" charset="0"/>
-              </a:rPr>
-              <a:t> </a:t>
-            </a:r>
-            <a:r>
-              <a:rPr lang="en-US" sz="1400" dirty="0">
-                <a:latin typeface="Arial" panose="020B0604020202020204" pitchFamily="34" charset="0"/>
-                <a:cs typeface="Arial" panose="020B0604020202020204" pitchFamily="34" charset="0"/>
-                <a:sym typeface="Wingdings" pitchFamily="2" charset="2"/>
-              </a:rPr>
-              <a:t>:(</a:t>
-            </a:r>
-            <a:endParaRPr lang="en-US" sz="1400" dirty="0">
-              <a:latin typeface="Arial" panose="020B0604020202020204" pitchFamily="34" charset="0"/>
-              <a:cs typeface="Arial" panose="020B0604020202020204" pitchFamily="34" charset="0"/>
-            </a:endParaRPr>
-          </a:p>
-          <a:p>
-            <a:pPr marL="742950" lvl="1" indent="-285750" algn="just">
-              <a:lnSpc>
-                <a:spcPts val="2320"/>
-              </a:lnSpc>
-              <a:buFont typeface="Arial" panose="020B0604020202020204" pitchFamily="34" charset="0"/>
-              <a:buChar char="•"/>
-            </a:pPr>
-            <a:r>
-              <a:rPr lang="en-US" sz="1400" dirty="0" err="1">
-                <a:latin typeface="Arial" panose="020B0604020202020204" pitchFamily="34" charset="0"/>
-                <a:cs typeface="Arial" panose="020B0604020202020204" pitchFamily="34" charset="0"/>
-              </a:rPr>
-              <a:t>Взаимодействует</a:t>
-            </a:r>
-            <a:r>
-              <a:rPr lang="en-US" sz="1400" dirty="0">
-                <a:latin typeface="Arial" panose="020B0604020202020204" pitchFamily="34" charset="0"/>
-                <a:cs typeface="Arial" panose="020B0604020202020204" pitchFamily="34" charset="0"/>
-              </a:rPr>
-              <a:t> </a:t>
-            </a:r>
-            <a:r>
-              <a:rPr lang="en-US" sz="1400" dirty="0" err="1">
-                <a:latin typeface="Arial" panose="020B0604020202020204" pitchFamily="34" charset="0"/>
-                <a:cs typeface="Arial" panose="020B0604020202020204" pitchFamily="34" charset="0"/>
-              </a:rPr>
-              <a:t>с</a:t>
-            </a:r>
-            <a:r>
-              <a:rPr lang="en-US" sz="1400" dirty="0">
-                <a:latin typeface="Arial" panose="020B0604020202020204" pitchFamily="34" charset="0"/>
-                <a:cs typeface="Arial" panose="020B0604020202020204" pitchFamily="34" charset="0"/>
-              </a:rPr>
-              <a:t> </a:t>
-            </a:r>
-            <a:r>
-              <a:rPr lang="en-US" sz="1400" dirty="0" err="1">
-                <a:latin typeface="Arial" panose="020B0604020202020204" pitchFamily="34" charset="0"/>
-                <a:cs typeface="Arial" panose="020B0604020202020204" pitchFamily="34" charset="0"/>
-              </a:rPr>
-              <a:t>командой</a:t>
-            </a:r>
-            <a:r>
-              <a:rPr lang="en-US" sz="1400" dirty="0">
-                <a:latin typeface="Arial" panose="020B0604020202020204" pitchFamily="34" charset="0"/>
-                <a:cs typeface="Arial" panose="020B0604020202020204" pitchFamily="34" charset="0"/>
-              </a:rPr>
-              <a:t> </a:t>
-            </a:r>
-            <a:r>
-              <a:rPr lang="en-US" sz="1400" dirty="0" err="1">
-                <a:latin typeface="Arial" panose="020B0604020202020204" pitchFamily="34" charset="0"/>
-                <a:cs typeface="Arial" panose="020B0604020202020204" pitchFamily="34" charset="0"/>
-              </a:rPr>
-              <a:t>через</a:t>
-            </a:r>
-            <a:r>
-              <a:rPr lang="en-US" sz="1400" dirty="0">
-                <a:latin typeface="Arial" panose="020B0604020202020204" pitchFamily="34" charset="0"/>
-                <a:cs typeface="Arial" panose="020B0604020202020204" pitchFamily="34" charset="0"/>
-              </a:rPr>
-              <a:t> GitHub </a:t>
-            </a:r>
-            <a:r>
-              <a:rPr lang="en-US" sz="1400" dirty="0" err="1">
-                <a:latin typeface="Arial" panose="020B0604020202020204" pitchFamily="34" charset="0"/>
-                <a:cs typeface="Arial" panose="020B0604020202020204" pitchFamily="34" charset="0"/>
-              </a:rPr>
-              <a:t>и</a:t>
-            </a:r>
-            <a:r>
-              <a:rPr lang="en-US" sz="1400" dirty="0">
-                <a:latin typeface="Arial" panose="020B0604020202020204" pitchFamily="34" charset="0"/>
-                <a:cs typeface="Arial" panose="020B0604020202020204" pitchFamily="34" charset="0"/>
-              </a:rPr>
-              <a:t> Telegram (</a:t>
-            </a:r>
-            <a:r>
-              <a:rPr lang="en-US" sz="1400" dirty="0" err="1">
-                <a:latin typeface="Arial" panose="020B0604020202020204" pitchFamily="34" charset="0"/>
-                <a:cs typeface="Arial" panose="020B0604020202020204" pitchFamily="34" charset="0"/>
-              </a:rPr>
-              <a:t>но</a:t>
-            </a:r>
-            <a:r>
-              <a:rPr lang="en-US" sz="1400" dirty="0">
-                <a:latin typeface="Arial" panose="020B0604020202020204" pitchFamily="34" charset="0"/>
-                <a:cs typeface="Arial" panose="020B0604020202020204" pitchFamily="34" charset="0"/>
-              </a:rPr>
-              <a:t> </a:t>
-            </a:r>
-            <a:r>
-              <a:rPr lang="en-US" sz="1400" dirty="0" err="1">
-                <a:latin typeface="Arial" panose="020B0604020202020204" pitchFamily="34" charset="0"/>
-                <a:cs typeface="Arial" panose="020B0604020202020204" pitchFamily="34" charset="0"/>
-              </a:rPr>
-              <a:t>в</a:t>
-            </a:r>
-            <a:r>
-              <a:rPr lang="en-US" sz="1400" dirty="0">
-                <a:latin typeface="Arial" panose="020B0604020202020204" pitchFamily="34" charset="0"/>
-                <a:cs typeface="Arial" panose="020B0604020202020204" pitchFamily="34" charset="0"/>
-              </a:rPr>
-              <a:t> </a:t>
-            </a:r>
-            <a:r>
-              <a:rPr lang="en-US" sz="1400" dirty="0" err="1">
-                <a:latin typeface="Arial" panose="020B0604020202020204" pitchFamily="34" charset="0"/>
-                <a:cs typeface="Arial" panose="020B0604020202020204" pitchFamily="34" charset="0"/>
-              </a:rPr>
-              <a:t>основном</a:t>
-            </a:r>
-            <a:r>
-              <a:rPr lang="en-US" sz="1400" dirty="0">
-                <a:latin typeface="Arial" panose="020B0604020202020204" pitchFamily="34" charset="0"/>
-                <a:cs typeface="Arial" panose="020B0604020202020204" pitchFamily="34" charset="0"/>
-              </a:rPr>
-              <a:t> GitHub)</a:t>
-            </a:r>
-          </a:p>
-          <a:p>
-            <a:pPr marL="742950" lvl="1" indent="-285750" algn="just">
-              <a:lnSpc>
-                <a:spcPts val="2320"/>
-              </a:lnSpc>
-              <a:buFont typeface="Arial" panose="020B0604020202020204" pitchFamily="34" charset="0"/>
-              <a:buChar char="•"/>
-            </a:pPr>
-            <a:r>
-              <a:rPr lang="en-US" sz="1400" dirty="0" err="1">
-                <a:latin typeface="Arial" panose="020B0604020202020204" pitchFamily="34" charset="0"/>
-                <a:cs typeface="Arial" panose="020B0604020202020204" pitchFamily="34" charset="0"/>
-              </a:rPr>
-              <a:t>Первая</a:t>
-            </a:r>
-            <a:r>
-              <a:rPr lang="en-US" sz="1400" dirty="0">
-                <a:latin typeface="Arial" panose="020B0604020202020204" pitchFamily="34" charset="0"/>
-                <a:cs typeface="Arial" panose="020B0604020202020204" pitchFamily="34" charset="0"/>
-              </a:rPr>
-              <a:t> </a:t>
-            </a:r>
-            <a:r>
-              <a:rPr lang="en-US" sz="1400" dirty="0" err="1">
-                <a:latin typeface="Arial" panose="020B0604020202020204" pitchFamily="34" charset="0"/>
-                <a:cs typeface="Arial" panose="020B0604020202020204" pitchFamily="34" charset="0"/>
-              </a:rPr>
-              <a:t>фаза</a:t>
-            </a:r>
-            <a:r>
-              <a:rPr lang="en-US" sz="1400" dirty="0">
-                <a:latin typeface="Arial" panose="020B0604020202020204" pitchFamily="34" charset="0"/>
-                <a:cs typeface="Arial" panose="020B0604020202020204" pitchFamily="34" charset="0"/>
-              </a:rPr>
-              <a:t> – </a:t>
-            </a:r>
-            <a:r>
-              <a:rPr lang="en-US" sz="1400" b="1" dirty="0" err="1">
-                <a:latin typeface="Arial" panose="020B0604020202020204" pitchFamily="34" charset="0"/>
-                <a:cs typeface="Arial" panose="020B0604020202020204" pitchFamily="34" charset="0"/>
-              </a:rPr>
-              <a:t>сбор</a:t>
-            </a:r>
-            <a:r>
-              <a:rPr lang="en-US" sz="1400" b="1" dirty="0">
-                <a:latin typeface="Arial" panose="020B0604020202020204" pitchFamily="34" charset="0"/>
-                <a:cs typeface="Arial" panose="020B0604020202020204" pitchFamily="34" charset="0"/>
-              </a:rPr>
-              <a:t> </a:t>
-            </a:r>
-            <a:r>
-              <a:rPr lang="en-US" sz="1400" b="1" dirty="0" err="1">
-                <a:latin typeface="Arial" panose="020B0604020202020204" pitchFamily="34" charset="0"/>
-                <a:cs typeface="Arial" panose="020B0604020202020204" pitchFamily="34" charset="0"/>
-              </a:rPr>
-              <a:t>требований</a:t>
-            </a:r>
-            <a:r>
-              <a:rPr lang="en-US" sz="1400" dirty="0">
-                <a:latin typeface="Arial" panose="020B0604020202020204" pitchFamily="34" charset="0"/>
-                <a:cs typeface="Arial" panose="020B0604020202020204" pitchFamily="34" charset="0"/>
-              </a:rPr>
-              <a:t> (</a:t>
-            </a:r>
-            <a:r>
-              <a:rPr lang="en-US" sz="1400" dirty="0" err="1">
-                <a:latin typeface="Arial" panose="020B0604020202020204" pitchFamily="34" charset="0"/>
-                <a:cs typeface="Arial" panose="020B0604020202020204" pitchFamily="34" charset="0"/>
-              </a:rPr>
-              <a:t>до</a:t>
-            </a:r>
-            <a:r>
-              <a:rPr lang="en-US" sz="1400" dirty="0">
-                <a:latin typeface="Arial" panose="020B0604020202020204" pitchFamily="34" charset="0"/>
-                <a:cs typeface="Arial" panose="020B0604020202020204" pitchFamily="34" charset="0"/>
-              </a:rPr>
-              <a:t> 14.02):</a:t>
-            </a:r>
-          </a:p>
-          <a:p>
-            <a:pPr marL="1200150" lvl="2" indent="-285750" algn="just">
-              <a:lnSpc>
-                <a:spcPts val="2320"/>
-              </a:lnSpc>
-              <a:buFont typeface="Arial" panose="020B0604020202020204" pitchFamily="34" charset="0"/>
-              <a:buChar char="•"/>
-            </a:pPr>
-            <a:r>
-              <a:rPr lang="en-US" sz="1400" dirty="0" err="1">
-                <a:latin typeface="Arial" panose="020B0604020202020204" pitchFamily="34" charset="0"/>
-                <a:cs typeface="Arial" panose="020B0604020202020204" pitchFamily="34" charset="0"/>
-              </a:rPr>
-              <a:t>Выбрать</a:t>
-            </a:r>
-            <a:r>
-              <a:rPr lang="en-US" sz="1400" dirty="0">
-                <a:latin typeface="Arial" panose="020B0604020202020204" pitchFamily="34" charset="0"/>
-                <a:cs typeface="Arial" panose="020B0604020202020204" pitchFamily="34" charset="0"/>
-              </a:rPr>
-              <a:t> </a:t>
-            </a:r>
-            <a:r>
-              <a:rPr lang="en-US" sz="1400" b="1" dirty="0" err="1">
-                <a:latin typeface="Arial" panose="020B0604020202020204" pitchFamily="34" charset="0"/>
-                <a:cs typeface="Arial" panose="020B0604020202020204" pitchFamily="34" charset="0"/>
-              </a:rPr>
-              <a:t>тему</a:t>
-            </a:r>
-            <a:r>
-              <a:rPr lang="en-US" sz="1400" b="1" dirty="0">
-                <a:latin typeface="Arial" panose="020B0604020202020204" pitchFamily="34" charset="0"/>
-                <a:cs typeface="Arial" panose="020B0604020202020204" pitchFamily="34" charset="0"/>
-              </a:rPr>
-              <a:t> </a:t>
-            </a:r>
-            <a:r>
-              <a:rPr lang="en-US" sz="1400" b="1" dirty="0" err="1">
-                <a:latin typeface="Arial" panose="020B0604020202020204" pitchFamily="34" charset="0"/>
-                <a:cs typeface="Arial" panose="020B0604020202020204" pitchFamily="34" charset="0"/>
-              </a:rPr>
-              <a:t>проекта</a:t>
-            </a:r>
-            <a:r>
-              <a:rPr lang="en-US" sz="1400" dirty="0">
-                <a:latin typeface="Arial" panose="020B0604020202020204" pitchFamily="34" charset="0"/>
-                <a:cs typeface="Arial" panose="020B0604020202020204" pitchFamily="34" charset="0"/>
-              </a:rPr>
-              <a:t> </a:t>
-            </a:r>
-            <a:r>
-              <a:rPr lang="en-US" sz="1400" dirty="0" err="1">
-                <a:latin typeface="Arial" panose="020B0604020202020204" pitchFamily="34" charset="0"/>
-                <a:cs typeface="Arial" panose="020B0604020202020204" pitchFamily="34" charset="0"/>
-              </a:rPr>
-              <a:t>до</a:t>
-            </a:r>
-            <a:r>
-              <a:rPr lang="en-US" sz="1400" dirty="0">
-                <a:latin typeface="Arial" panose="020B0604020202020204" pitchFamily="34" charset="0"/>
-                <a:cs typeface="Arial" panose="020B0604020202020204" pitchFamily="34" charset="0"/>
-              </a:rPr>
-              <a:t> 07.02 (</a:t>
-            </a:r>
-            <a:r>
-              <a:rPr lang="en-US" sz="1400" dirty="0" err="1">
-                <a:latin typeface="Arial" panose="020B0604020202020204" pitchFamily="34" charset="0"/>
-                <a:cs typeface="Arial" panose="020B0604020202020204" pitchFamily="34" charset="0"/>
-              </a:rPr>
-              <a:t>выбор</a:t>
-            </a:r>
-            <a:r>
-              <a:rPr lang="en-US" sz="1400" dirty="0">
-                <a:latin typeface="Arial" panose="020B0604020202020204" pitchFamily="34" charset="0"/>
-                <a:cs typeface="Arial" panose="020B0604020202020204" pitchFamily="34" charset="0"/>
-              </a:rPr>
-              <a:t> </a:t>
-            </a:r>
-            <a:r>
-              <a:rPr lang="en-US" sz="1400" dirty="0" err="1">
-                <a:latin typeface="Arial" panose="020B0604020202020204" pitchFamily="34" charset="0"/>
-                <a:cs typeface="Arial" panose="020B0604020202020204" pitchFamily="34" charset="0"/>
-              </a:rPr>
-              <a:t>можно</a:t>
-            </a:r>
-            <a:r>
-              <a:rPr lang="en-US" sz="1400" dirty="0">
-                <a:latin typeface="Arial" panose="020B0604020202020204" pitchFamily="34" charset="0"/>
-                <a:cs typeface="Arial" panose="020B0604020202020204" pitchFamily="34" charset="0"/>
-              </a:rPr>
-              <a:t> </a:t>
-            </a:r>
-            <a:r>
-              <a:rPr lang="en-US" sz="1400" dirty="0" err="1">
-                <a:latin typeface="Arial" panose="020B0604020202020204" pitchFamily="34" charset="0"/>
-                <a:cs typeface="Arial" panose="020B0604020202020204" pitchFamily="34" charset="0"/>
-              </a:rPr>
-              <a:t>изменить</a:t>
-            </a:r>
-            <a:r>
-              <a:rPr lang="en-US" sz="1400" dirty="0">
-                <a:latin typeface="Arial" panose="020B0604020202020204" pitchFamily="34" charset="0"/>
-                <a:cs typeface="Arial" panose="020B0604020202020204" pitchFamily="34" charset="0"/>
-              </a:rPr>
-              <a:t> </a:t>
-            </a:r>
-            <a:r>
-              <a:rPr lang="en-US" sz="1400" dirty="0" err="1">
-                <a:latin typeface="Arial" panose="020B0604020202020204" pitchFamily="34" charset="0"/>
-                <a:cs typeface="Arial" panose="020B0604020202020204" pitchFamily="34" charset="0"/>
-              </a:rPr>
-              <a:t>до</a:t>
-            </a:r>
-            <a:r>
-              <a:rPr lang="en-US" sz="1400" dirty="0">
-                <a:latin typeface="Arial" panose="020B0604020202020204" pitchFamily="34" charset="0"/>
-                <a:cs typeface="Arial" panose="020B0604020202020204" pitchFamily="34" charset="0"/>
-              </a:rPr>
-              <a:t> 12.02 </a:t>
-            </a:r>
-            <a:r>
-              <a:rPr lang="en-US" sz="1400" dirty="0" err="1">
-                <a:latin typeface="Arial" panose="020B0604020202020204" pitchFamily="34" charset="0"/>
-                <a:cs typeface="Arial" panose="020B0604020202020204" pitchFamily="34" charset="0"/>
-              </a:rPr>
-              <a:t>простым</a:t>
-            </a:r>
-            <a:r>
-              <a:rPr lang="en-US" sz="1400" dirty="0">
-                <a:latin typeface="Arial" panose="020B0604020202020204" pitchFamily="34" charset="0"/>
-                <a:cs typeface="Arial" panose="020B0604020202020204" pitchFamily="34" charset="0"/>
-              </a:rPr>
-              <a:t> </a:t>
-            </a:r>
-            <a:r>
-              <a:rPr lang="en-US" sz="1400" dirty="0" err="1">
-                <a:latin typeface="Arial" panose="020B0604020202020204" pitchFamily="34" charset="0"/>
-                <a:cs typeface="Arial" panose="020B0604020202020204" pitchFamily="34" charset="0"/>
-              </a:rPr>
-              <a:t>большинством</a:t>
-            </a:r>
-            <a:r>
-              <a:rPr lang="en-US" sz="1400" dirty="0">
-                <a:latin typeface="Arial" panose="020B0604020202020204" pitchFamily="34" charset="0"/>
-                <a:cs typeface="Arial" panose="020B0604020202020204" pitchFamily="34" charset="0"/>
-              </a:rPr>
-              <a:t> </a:t>
-            </a:r>
-            <a:r>
-              <a:rPr lang="en-US" sz="1400" dirty="0" err="1">
-                <a:latin typeface="Arial" panose="020B0604020202020204" pitchFamily="34" charset="0"/>
-                <a:cs typeface="Arial" panose="020B0604020202020204" pitchFamily="34" charset="0"/>
-              </a:rPr>
-              <a:t>голосов</a:t>
-            </a:r>
-            <a:r>
-              <a:rPr lang="en-US" sz="1400" dirty="0">
-                <a:latin typeface="Arial" panose="020B0604020202020204" pitchFamily="34" charset="0"/>
-                <a:cs typeface="Arial" panose="020B0604020202020204" pitchFamily="34" charset="0"/>
-              </a:rPr>
-              <a:t> </a:t>
-            </a:r>
-            <a:r>
-              <a:rPr lang="en-US" sz="1400" dirty="0" err="1">
-                <a:latin typeface="Arial" panose="020B0604020202020204" pitchFamily="34" charset="0"/>
-                <a:cs typeface="Arial" panose="020B0604020202020204" pitchFamily="34" charset="0"/>
-              </a:rPr>
-              <a:t>в</a:t>
-            </a:r>
-            <a:r>
-              <a:rPr lang="en-US" sz="1400" dirty="0">
-                <a:latin typeface="Arial" panose="020B0604020202020204" pitchFamily="34" charset="0"/>
-                <a:cs typeface="Arial" panose="020B0604020202020204" pitchFamily="34" charset="0"/>
-              </a:rPr>
-              <a:t> </a:t>
-            </a:r>
-            <a:r>
-              <a:rPr lang="en-US" sz="1400" dirty="0" err="1">
-                <a:latin typeface="Arial" panose="020B0604020202020204" pitchFamily="34" charset="0"/>
-                <a:cs typeface="Arial" panose="020B0604020202020204" pitchFamily="34" charset="0"/>
-              </a:rPr>
-              <a:t>команде</a:t>
-            </a:r>
-            <a:r>
-              <a:rPr lang="en-US" sz="1400" dirty="0">
-                <a:latin typeface="Arial" panose="020B0604020202020204" pitchFamily="34" charset="0"/>
-                <a:cs typeface="Arial" panose="020B0604020202020204" pitchFamily="34" charset="0"/>
-              </a:rPr>
-              <a:t>)</a:t>
-            </a:r>
-          </a:p>
-          <a:p>
-            <a:pPr marL="1200150" lvl="2" indent="-285750" algn="just">
-              <a:lnSpc>
-                <a:spcPts val="2320"/>
-              </a:lnSpc>
-              <a:buFont typeface="Arial" panose="020B0604020202020204" pitchFamily="34" charset="0"/>
-              <a:buChar char="•"/>
-            </a:pPr>
-            <a:r>
-              <a:rPr lang="en-US" sz="1400" dirty="0" err="1">
-                <a:latin typeface="Arial" panose="020B0604020202020204" pitchFamily="34" charset="0"/>
-                <a:cs typeface="Arial" panose="020B0604020202020204" pitchFamily="34" charset="0"/>
-              </a:rPr>
-              <a:t>Сформулировать</a:t>
-            </a:r>
-            <a:r>
-              <a:rPr lang="en-US" sz="1400" dirty="0">
-                <a:latin typeface="Arial" panose="020B0604020202020204" pitchFamily="34" charset="0"/>
-                <a:cs typeface="Arial" panose="020B0604020202020204" pitchFamily="34" charset="0"/>
-              </a:rPr>
-              <a:t> </a:t>
-            </a:r>
-            <a:r>
-              <a:rPr lang="en-US" sz="1400" b="1" dirty="0">
-                <a:latin typeface="Arial" panose="020B0604020202020204" pitchFamily="34" charset="0"/>
-                <a:cs typeface="Arial" panose="020B0604020202020204" pitchFamily="34" charset="0"/>
-              </a:rPr>
-              <a:t>Product Vision</a:t>
-            </a:r>
-            <a:r>
-              <a:rPr lang="en-US" sz="1400" dirty="0">
-                <a:latin typeface="Arial" panose="020B0604020202020204" pitchFamily="34" charset="0"/>
-                <a:cs typeface="Arial" panose="020B0604020202020204" pitchFamily="34" charset="0"/>
-              </a:rPr>
-              <a:t>, «</a:t>
-            </a:r>
-            <a:r>
-              <a:rPr lang="en-US" sz="1400" dirty="0" err="1">
-                <a:latin typeface="Arial" panose="020B0604020202020204" pitchFamily="34" charset="0"/>
-                <a:cs typeface="Arial" panose="020B0604020202020204" pitchFamily="34" charset="0"/>
-              </a:rPr>
-              <a:t>в</a:t>
-            </a:r>
-            <a:r>
-              <a:rPr lang="en-US" sz="1400" b="1" dirty="0" err="1">
-                <a:latin typeface="Arial" panose="020B0604020202020204" pitchFamily="34" charset="0"/>
-                <a:cs typeface="Arial" panose="020B0604020202020204" pitchFamily="34" charset="0"/>
-              </a:rPr>
-              <a:t>И</a:t>
-            </a:r>
-            <a:r>
-              <a:rPr lang="en-US" sz="1400" dirty="0" err="1">
-                <a:latin typeface="Arial" panose="020B0604020202020204" pitchFamily="34" charset="0"/>
-                <a:cs typeface="Arial" panose="020B0604020202020204" pitchFamily="34" charset="0"/>
-              </a:rPr>
-              <a:t>дение</a:t>
-            </a:r>
-            <a:r>
-              <a:rPr lang="en-US" sz="1400" dirty="0">
-                <a:latin typeface="Arial" panose="020B0604020202020204" pitchFamily="34" charset="0"/>
-                <a:cs typeface="Arial" panose="020B0604020202020204" pitchFamily="34" charset="0"/>
-              </a:rPr>
-              <a:t> </a:t>
-            </a:r>
-            <a:r>
-              <a:rPr lang="en-US" sz="1400" dirty="0" err="1">
-                <a:latin typeface="Arial" panose="020B0604020202020204" pitchFamily="34" charset="0"/>
-                <a:cs typeface="Arial" panose="020B0604020202020204" pitchFamily="34" charset="0"/>
-              </a:rPr>
-              <a:t>продукта</a:t>
-            </a:r>
-            <a:r>
-              <a:rPr lang="en-US" sz="1400" dirty="0">
-                <a:latin typeface="Arial" panose="020B0604020202020204" pitchFamily="34" charset="0"/>
-                <a:cs typeface="Arial" panose="020B0604020202020204" pitchFamily="34" charset="0"/>
-              </a:rPr>
-              <a:t>» </a:t>
-            </a:r>
-            <a:r>
-              <a:rPr lang="en-US" sz="1400" dirty="0" err="1">
-                <a:latin typeface="Arial" panose="020B0604020202020204" pitchFamily="34" charset="0"/>
-                <a:cs typeface="Arial" panose="020B0604020202020204" pitchFamily="34" charset="0"/>
-              </a:rPr>
-              <a:t>до</a:t>
-            </a:r>
-            <a:r>
-              <a:rPr lang="en-US" sz="1400" dirty="0">
-                <a:latin typeface="Arial" panose="020B0604020202020204" pitchFamily="34" charset="0"/>
-                <a:cs typeface="Arial" panose="020B0604020202020204" pitchFamily="34" charset="0"/>
-              </a:rPr>
-              <a:t> 14.02</a:t>
-            </a:r>
-          </a:p>
-          <a:p>
-            <a:pPr marL="1200150" lvl="2" indent="-285750" algn="just">
-              <a:lnSpc>
-                <a:spcPts val="2320"/>
-              </a:lnSpc>
-              <a:buFont typeface="Arial" panose="020B0604020202020204" pitchFamily="34" charset="0"/>
-              <a:buChar char="•"/>
-            </a:pPr>
-            <a:r>
-              <a:rPr lang="en-US" sz="1400" dirty="0">
-                <a:latin typeface="Arial" panose="020B0604020202020204" pitchFamily="34" charset="0"/>
-                <a:cs typeface="Arial" panose="020B0604020202020204" pitchFamily="34" charset="0"/>
-              </a:rPr>
-              <a:t>@see </a:t>
-            </a:r>
-            <a:r>
-              <a:rPr lang="en-US" sz="1400" dirty="0">
-                <a:latin typeface="Arial" panose="020B0604020202020204" pitchFamily="34" charset="0"/>
-                <a:cs typeface="Arial" panose="020B0604020202020204" pitchFamily="34" charset="0"/>
-                <a:hlinkClick r:id="rId4"/>
-              </a:rPr>
-              <a:t>https://leadstartup.ru/db/product-vision</a:t>
-            </a:r>
-            <a:r>
-              <a:rPr lang="en-US" sz="1400" dirty="0">
-                <a:latin typeface="Arial" panose="020B0604020202020204" pitchFamily="34" charset="0"/>
-                <a:cs typeface="Arial" panose="020B0604020202020204" pitchFamily="34" charset="0"/>
-              </a:rPr>
-              <a:t>, </a:t>
-            </a:r>
-            <a:r>
-              <a:rPr lang="en-US" sz="1400" dirty="0">
-                <a:latin typeface="Arial" panose="020B0604020202020204" pitchFamily="34" charset="0"/>
-                <a:cs typeface="Arial" panose="020B0604020202020204" pitchFamily="34" charset="0"/>
-                <a:hlinkClick r:id="rId5"/>
-              </a:rPr>
-              <a:t>https://intuit.ru/studies/courses/2188/174/lecture/4724?page=2</a:t>
-            </a:r>
-            <a:r>
-              <a:rPr lang="en-US" sz="1400" dirty="0">
-                <a:latin typeface="Arial" panose="020B0604020202020204" pitchFamily="34" charset="0"/>
-                <a:cs typeface="Arial" panose="020B0604020202020204" pitchFamily="34" charset="0"/>
-              </a:rPr>
-              <a:t> </a:t>
-            </a:r>
-          </a:p>
-          <a:p>
-            <a:pPr marL="1200150" lvl="2" indent="-285750" algn="just">
-              <a:lnSpc>
-                <a:spcPts val="2320"/>
-              </a:lnSpc>
-              <a:buFont typeface="Arial" panose="020B0604020202020204" pitchFamily="34" charset="0"/>
-              <a:buChar char="•"/>
-            </a:pPr>
-            <a:r>
-              <a:rPr lang="en-US" sz="1400" dirty="0" err="1">
-                <a:latin typeface="Arial" panose="020B0604020202020204" pitchFamily="34" charset="0"/>
-                <a:cs typeface="Arial" panose="020B0604020202020204" pitchFamily="34" charset="0"/>
-              </a:rPr>
-              <a:t>Описать</a:t>
-            </a:r>
-            <a:r>
-              <a:rPr lang="en-US" sz="1400" dirty="0">
-                <a:latin typeface="Arial" panose="020B0604020202020204" pitchFamily="34" charset="0"/>
-                <a:cs typeface="Arial" panose="020B0604020202020204" pitchFamily="34" charset="0"/>
-              </a:rPr>
-              <a:t> </a:t>
-            </a:r>
-            <a:r>
-              <a:rPr lang="en-US" sz="1400" dirty="0" err="1">
-                <a:latin typeface="Arial" panose="020B0604020202020204" pitchFamily="34" charset="0"/>
-                <a:cs typeface="Arial" panose="020B0604020202020204" pitchFamily="34" charset="0"/>
-              </a:rPr>
-              <a:t>пользовательские</a:t>
-            </a:r>
-            <a:r>
-              <a:rPr lang="en-US" sz="1400" dirty="0">
-                <a:latin typeface="Arial" panose="020B0604020202020204" pitchFamily="34" charset="0"/>
-                <a:cs typeface="Arial" panose="020B0604020202020204" pitchFamily="34" charset="0"/>
-              </a:rPr>
-              <a:t> </a:t>
-            </a:r>
-            <a:r>
-              <a:rPr lang="en-US" sz="1400" dirty="0" err="1">
-                <a:latin typeface="Arial" panose="020B0604020202020204" pitchFamily="34" charset="0"/>
-                <a:cs typeface="Arial" panose="020B0604020202020204" pitchFamily="34" charset="0"/>
-              </a:rPr>
-              <a:t>истории</a:t>
-            </a:r>
-            <a:r>
-              <a:rPr lang="en-US" sz="1400" dirty="0">
-                <a:latin typeface="Arial" panose="020B0604020202020204" pitchFamily="34" charset="0"/>
-                <a:cs typeface="Arial" panose="020B0604020202020204" pitchFamily="34" charset="0"/>
-              </a:rPr>
-              <a:t> (</a:t>
-            </a:r>
-            <a:r>
-              <a:rPr lang="en-US" sz="1400" b="1" dirty="0">
-                <a:latin typeface="Arial" panose="020B0604020202020204" pitchFamily="34" charset="0"/>
-                <a:cs typeface="Arial" panose="020B0604020202020204" pitchFamily="34" charset="0"/>
-              </a:rPr>
-              <a:t>User Stories</a:t>
-            </a:r>
-            <a:r>
-              <a:rPr lang="en-US" sz="1400" dirty="0">
-                <a:latin typeface="Arial" panose="020B0604020202020204" pitchFamily="34" charset="0"/>
-                <a:cs typeface="Arial" panose="020B0604020202020204" pitchFamily="34" charset="0"/>
-              </a:rPr>
-              <a:t>)/</a:t>
-            </a:r>
-            <a:r>
-              <a:rPr lang="en-US" sz="1400" dirty="0" err="1">
-                <a:latin typeface="Arial" panose="020B0604020202020204" pitchFamily="34" charset="0"/>
-                <a:cs typeface="Arial" panose="020B0604020202020204" pitchFamily="34" charset="0"/>
-              </a:rPr>
-              <a:t>сценарии</a:t>
-            </a:r>
-            <a:r>
-              <a:rPr lang="en-US" sz="1400" dirty="0">
-                <a:latin typeface="Arial" panose="020B0604020202020204" pitchFamily="34" charset="0"/>
-                <a:cs typeface="Arial" panose="020B0604020202020204" pitchFamily="34" charset="0"/>
-              </a:rPr>
-              <a:t> </a:t>
-            </a:r>
-            <a:r>
-              <a:rPr lang="en-US" sz="1400" dirty="0" err="1">
-                <a:latin typeface="Arial" panose="020B0604020202020204" pitchFamily="34" charset="0"/>
-                <a:cs typeface="Arial" panose="020B0604020202020204" pitchFamily="34" charset="0"/>
-              </a:rPr>
-              <a:t>использования</a:t>
-            </a:r>
-            <a:r>
-              <a:rPr lang="en-US" sz="1400" dirty="0">
-                <a:latin typeface="Arial" panose="020B0604020202020204" pitchFamily="34" charset="0"/>
-                <a:cs typeface="Arial" panose="020B0604020202020204" pitchFamily="34" charset="0"/>
-              </a:rPr>
-              <a:t> (</a:t>
-            </a:r>
-            <a:r>
-              <a:rPr lang="en-US" sz="1400" b="1" dirty="0">
-                <a:latin typeface="Arial" panose="020B0604020202020204" pitchFamily="34" charset="0"/>
-                <a:cs typeface="Arial" panose="020B0604020202020204" pitchFamily="34" charset="0"/>
-              </a:rPr>
-              <a:t>Use Cases</a:t>
-            </a:r>
-            <a:r>
-              <a:rPr lang="en-US" sz="1400" dirty="0">
-                <a:latin typeface="Arial" panose="020B0604020202020204" pitchFamily="34" charset="0"/>
-                <a:cs typeface="Arial" panose="020B0604020202020204" pitchFamily="34" charset="0"/>
-              </a:rPr>
-              <a:t>) </a:t>
-            </a:r>
-            <a:r>
-              <a:rPr lang="en-US" sz="1400" dirty="0" err="1">
-                <a:latin typeface="Arial" panose="020B0604020202020204" pitchFamily="34" charset="0"/>
-                <a:cs typeface="Arial" panose="020B0604020202020204" pitchFamily="34" charset="0"/>
-              </a:rPr>
-              <a:t>до</a:t>
-            </a:r>
-            <a:r>
-              <a:rPr lang="en-US" sz="1400" dirty="0">
-                <a:latin typeface="Arial" panose="020B0604020202020204" pitchFamily="34" charset="0"/>
-                <a:cs typeface="Arial" panose="020B0604020202020204" pitchFamily="34" charset="0"/>
-              </a:rPr>
-              <a:t> 14.02</a:t>
-            </a:r>
-          </a:p>
-          <a:p>
-            <a:pPr marL="1200150" lvl="2" indent="-285750" algn="just">
-              <a:lnSpc>
-                <a:spcPts val="2320"/>
-              </a:lnSpc>
-              <a:buFont typeface="Arial" panose="020B0604020202020204" pitchFamily="34" charset="0"/>
-              <a:buChar char="•"/>
-            </a:pPr>
-            <a:r>
-              <a:rPr lang="en-US" sz="1400" dirty="0">
-                <a:latin typeface="Arial" panose="020B0604020202020204" pitchFamily="34" charset="0"/>
-                <a:cs typeface="Arial" panose="020B0604020202020204" pitchFamily="34" charset="0"/>
-              </a:rPr>
-              <a:t>@see </a:t>
-            </a:r>
-            <a:r>
-              <a:rPr lang="en-US" sz="1400" dirty="0">
-                <a:latin typeface="Arial" panose="020B0604020202020204" pitchFamily="34" charset="0"/>
-                <a:cs typeface="Arial" panose="020B0604020202020204" pitchFamily="34" charset="0"/>
-                <a:hlinkClick r:id="rId6"/>
-              </a:rPr>
-              <a:t>https://ru.wikipedia.org/wiki/Пользовательские_истории</a:t>
-            </a:r>
-            <a:r>
-              <a:rPr lang="en-US" sz="1400" dirty="0">
-                <a:latin typeface="Arial" panose="020B0604020202020204" pitchFamily="34" charset="0"/>
-                <a:cs typeface="Arial" panose="020B0604020202020204" pitchFamily="34" charset="0"/>
-              </a:rPr>
-              <a:t>,</a:t>
-            </a:r>
-          </a:p>
-          <a:p>
-            <a:pPr marL="1200150" lvl="2" indent="-285750" algn="just">
-              <a:lnSpc>
-                <a:spcPts val="2320"/>
-              </a:lnSpc>
-              <a:buFont typeface="Arial" panose="020B0604020202020204" pitchFamily="34" charset="0"/>
-              <a:buChar char="•"/>
-            </a:pPr>
-            <a:r>
-              <a:rPr lang="en-US" sz="1400" dirty="0">
-                <a:latin typeface="Arial" panose="020B0604020202020204" pitchFamily="34" charset="0"/>
-                <a:cs typeface="Arial" panose="020B0604020202020204" pitchFamily="34" charset="0"/>
-              </a:rPr>
-              <a:t>@see </a:t>
-            </a:r>
-            <a:r>
-              <a:rPr lang="en-US" sz="1400" dirty="0">
-                <a:latin typeface="Arial" panose="020B0604020202020204" pitchFamily="34" charset="0"/>
-                <a:cs typeface="Arial" panose="020B0604020202020204" pitchFamily="34" charset="0"/>
-                <a:hlinkClick r:id="rId7"/>
-              </a:rPr>
-              <a:t>https://pmclub.pro/articles/user-story-pora-primenyat-pravilno</a:t>
-            </a:r>
-            <a:r>
-              <a:rPr lang="en-US" sz="1400" dirty="0">
-                <a:latin typeface="Arial" panose="020B0604020202020204" pitchFamily="34" charset="0"/>
-                <a:cs typeface="Arial" panose="020B0604020202020204" pitchFamily="34" charset="0"/>
-              </a:rPr>
-              <a:t> </a:t>
-            </a:r>
-          </a:p>
-          <a:p>
-            <a:pPr algn="just">
-              <a:lnSpc>
-                <a:spcPts val="2320"/>
-              </a:lnSpc>
-            </a:pPr>
-            <a:r>
-              <a:rPr lang="en-US" sz="1600" dirty="0">
-                <a:latin typeface="Arial" panose="020B0604020202020204" pitchFamily="34" charset="0"/>
-                <a:cs typeface="Arial" panose="020B0604020202020204" pitchFamily="34" charset="0"/>
-              </a:rPr>
-              <a:t>●</a:t>
-            </a:r>
-            <a:r>
-              <a:rPr lang="en-US" sz="1600" dirty="0" err="1">
-                <a:latin typeface="Arial" panose="020B0604020202020204" pitchFamily="34" charset="0"/>
-                <a:cs typeface="Arial" panose="020B0604020202020204" pitchFamily="34" charset="0"/>
-              </a:rPr>
-              <a:t>На</a:t>
-            </a:r>
-            <a:r>
-              <a:rPr lang="en-US" sz="1600" dirty="0">
-                <a:latin typeface="Arial" panose="020B0604020202020204" pitchFamily="34" charset="0"/>
-                <a:cs typeface="Arial" panose="020B0604020202020204" pitchFamily="34" charset="0"/>
-              </a:rPr>
-              <a:t> </a:t>
-            </a:r>
-            <a:r>
-              <a:rPr lang="en-US" sz="1600" dirty="0" err="1">
-                <a:latin typeface="Arial" panose="020B0604020202020204" pitchFamily="34" charset="0"/>
-                <a:cs typeface="Arial" panose="020B0604020202020204" pitchFamily="34" charset="0"/>
-              </a:rPr>
-              <a:t>каждом</a:t>
-            </a:r>
-            <a:r>
-              <a:rPr lang="en-US" sz="1600" dirty="0">
-                <a:latin typeface="Arial" panose="020B0604020202020204" pitchFamily="34" charset="0"/>
-                <a:cs typeface="Arial" panose="020B0604020202020204" pitchFamily="34" charset="0"/>
-              </a:rPr>
-              <a:t> </a:t>
-            </a:r>
-            <a:r>
-              <a:rPr lang="en-US" sz="1600" b="1" dirty="0" err="1">
-                <a:latin typeface="Arial" panose="020B0604020202020204" pitchFamily="34" charset="0"/>
-                <a:cs typeface="Arial" panose="020B0604020202020204" pitchFamily="34" charset="0"/>
-              </a:rPr>
-              <a:t>демо-дне</a:t>
-            </a:r>
-            <a:r>
-              <a:rPr lang="en-US" sz="1600" dirty="0">
-                <a:latin typeface="Arial" panose="020B0604020202020204" pitchFamily="34" charset="0"/>
-                <a:cs typeface="Arial" panose="020B0604020202020204" pitchFamily="34" charset="0"/>
-              </a:rPr>
-              <a:t>⭐️ </a:t>
-            </a:r>
-            <a:r>
-              <a:rPr lang="en-US" sz="1600" dirty="0" err="1">
-                <a:latin typeface="Arial" panose="020B0604020202020204" pitchFamily="34" charset="0"/>
-                <a:cs typeface="Arial" panose="020B0604020202020204" pitchFamily="34" charset="0"/>
-              </a:rPr>
-              <a:t>от</a:t>
-            </a:r>
-            <a:r>
-              <a:rPr lang="en-US" sz="1600" dirty="0">
-                <a:latin typeface="Arial" panose="020B0604020202020204" pitchFamily="34" charset="0"/>
-                <a:cs typeface="Arial" panose="020B0604020202020204" pitchFamily="34" charset="0"/>
-              </a:rPr>
-              <a:t> </a:t>
-            </a:r>
-            <a:r>
-              <a:rPr lang="en-US" sz="1600" dirty="0" err="1">
-                <a:latin typeface="Arial" panose="020B0604020202020204" pitchFamily="34" charset="0"/>
-                <a:cs typeface="Arial" panose="020B0604020202020204" pitchFamily="34" charset="0"/>
-              </a:rPr>
-              <a:t>каждой</a:t>
-            </a:r>
-            <a:r>
-              <a:rPr lang="en-US" sz="1600" dirty="0">
-                <a:latin typeface="Arial" panose="020B0604020202020204" pitchFamily="34" charset="0"/>
-                <a:cs typeface="Arial" panose="020B0604020202020204" pitchFamily="34" charset="0"/>
-              </a:rPr>
-              <a:t> </a:t>
-            </a:r>
-            <a:r>
-              <a:rPr lang="en-US" sz="1600" dirty="0" err="1">
-                <a:latin typeface="Arial" panose="020B0604020202020204" pitchFamily="34" charset="0"/>
-                <a:cs typeface="Arial" panose="020B0604020202020204" pitchFamily="34" charset="0"/>
-              </a:rPr>
-              <a:t>команды</a:t>
-            </a:r>
-            <a:r>
-              <a:rPr lang="en-US" sz="1600" dirty="0">
-                <a:latin typeface="Arial" panose="020B0604020202020204" pitchFamily="34" charset="0"/>
-                <a:cs typeface="Arial" panose="020B0604020202020204" pitchFamily="34" charset="0"/>
-              </a:rPr>
-              <a:t> – </a:t>
-            </a:r>
-            <a:r>
-              <a:rPr lang="en-US" sz="1600" dirty="0" err="1">
-                <a:latin typeface="Arial" panose="020B0604020202020204" pitchFamily="34" charset="0"/>
-                <a:cs typeface="Arial" panose="020B0604020202020204" pitchFamily="34" charset="0"/>
-              </a:rPr>
-              <a:t>мини-демо</a:t>
-            </a:r>
-            <a:r>
-              <a:rPr lang="en-US" sz="1600" dirty="0">
-                <a:latin typeface="Arial" panose="020B0604020202020204" pitchFamily="34" charset="0"/>
-                <a:cs typeface="Arial" panose="020B0604020202020204" pitchFamily="34" charset="0"/>
-              </a:rPr>
-              <a:t> </a:t>
-            </a:r>
-            <a:r>
-              <a:rPr lang="en-US" sz="1600" dirty="0" err="1">
-                <a:latin typeface="Arial" panose="020B0604020202020204" pitchFamily="34" charset="0"/>
-                <a:cs typeface="Arial" panose="020B0604020202020204" pitchFamily="34" charset="0"/>
-              </a:rPr>
-              <a:t>проекта</a:t>
-            </a:r>
-            <a:r>
-              <a:rPr lang="en-US" sz="1600" dirty="0">
-                <a:latin typeface="Arial" panose="020B0604020202020204" pitchFamily="34" charset="0"/>
-                <a:cs typeface="Arial" panose="020B0604020202020204" pitchFamily="34" charset="0"/>
-              </a:rPr>
-              <a:t> </a:t>
-            </a:r>
-            <a:r>
-              <a:rPr lang="en-US" sz="1600" dirty="0" err="1">
-                <a:latin typeface="Arial" panose="020B0604020202020204" pitchFamily="34" charset="0"/>
-                <a:cs typeface="Arial" panose="020B0604020202020204" pitchFamily="34" charset="0"/>
-              </a:rPr>
-              <a:t>на</a:t>
-            </a:r>
-            <a:r>
-              <a:rPr lang="en-US" sz="1600" dirty="0">
-                <a:latin typeface="Arial" panose="020B0604020202020204" pitchFamily="34" charset="0"/>
-                <a:cs typeface="Arial" panose="020B0604020202020204" pitchFamily="34" charset="0"/>
-              </a:rPr>
-              <a:t> 5-7 </a:t>
-            </a:r>
-            <a:r>
-              <a:rPr lang="en-US" sz="1600" dirty="0" err="1">
-                <a:latin typeface="Arial" panose="020B0604020202020204" pitchFamily="34" charset="0"/>
-                <a:cs typeface="Arial" panose="020B0604020202020204" pitchFamily="34" charset="0"/>
-              </a:rPr>
-              <a:t>мин</a:t>
-            </a:r>
-            <a:r>
-              <a:rPr lang="en-US" sz="1600" dirty="0">
-                <a:latin typeface="Arial" panose="020B0604020202020204" pitchFamily="34" charset="0"/>
-                <a:cs typeface="Arial" panose="020B0604020202020204" pitchFamily="34" charset="0"/>
-              </a:rPr>
-              <a:t>.</a:t>
-            </a:r>
           </a:p>
         </p:txBody>
       </p:sp>
       <p:sp>
         <p:nvSpPr>
-          <p:cNvPr id="11" name="TextBox 10">
+          <p:cNvPr id="3" name="Content Placeholder 2">
             <a:extLst>
               <a:ext uri="{FF2B5EF4-FFF2-40B4-BE49-F238E27FC236}">
-                <a16:creationId xmlns:a16="http://schemas.microsoft.com/office/drawing/2014/main" id="{62CD3061-075B-AA3F-7C17-79FBB443E3D0}"/>
+                <a16:creationId xmlns:a16="http://schemas.microsoft.com/office/drawing/2014/main" id="{DC591F69-11FB-94FB-D83A-FE1973BA79E7}"/>
               </a:ext>
             </a:extLst>
           </p:cNvPr>
-          <p:cNvSpPr txBox="1"/>
-          <p:nvPr/>
+          <p:cNvSpPr>
+            <a:spLocks noGrp="1"/>
+          </p:cNvSpPr>
+          <p:nvPr>
+            <p:ph idx="1"/>
+          </p:nvPr>
         </p:nvSpPr>
         <p:spPr>
           <a:xfrm>
-            <a:off x="3184989" y="257812"/>
-            <a:ext cx="6092575" cy="646331"/>
+            <a:off x="838200" y="1273996"/>
+            <a:ext cx="10935984" cy="4902967"/>
           </a:xfrm>
-          <a:prstGeom prst="rect">
-            <a:avLst/>
-          </a:prstGeom>
-          <a:noFill/>
         </p:spPr>
         <p:txBody>
-          <a:bodyPr wrap="square" rtlCol="0">
-            <a:spAutoFit/>
+          <a:bodyPr>
+            <a:noAutofit/>
           </a:bodyPr>
           <a:lstStyle/>
           <a:p>
             <a:r>
-              <a:rPr lang="ru-RU" sz="3600" b="1" dirty="0">
-                <a:latin typeface="Arial" panose="020B0604020202020204" pitchFamily="34" charset="0"/>
-                <a:cs typeface="Arial" panose="020B0604020202020204" pitchFamily="34" charset="0"/>
-              </a:rPr>
-              <a:t>Командный проект (1)</a:t>
-            </a:r>
-            <a:endParaRPr lang="en-US" sz="3600" b="1" dirty="0">
+              <a:rPr lang="ru-RU" sz="2000" b="1" dirty="0">
+                <a:latin typeface="Arial" panose="020B0604020202020204" pitchFamily="34" charset="0"/>
+                <a:cs typeface="Arial" panose="020B0604020202020204" pitchFamily="34" charset="0"/>
+              </a:rPr>
+              <a:t>Обязательно</a:t>
+            </a:r>
+            <a:r>
+              <a:rPr lang="ru-RU" sz="2000" dirty="0">
+                <a:latin typeface="Arial" panose="020B0604020202020204" pitchFamily="34" charset="0"/>
+                <a:cs typeface="Arial" panose="020B0604020202020204" pitchFamily="34" charset="0"/>
+              </a:rPr>
+              <a:t>:</a:t>
+            </a:r>
+          </a:p>
+          <a:p>
+            <a:pPr lvl="1"/>
+            <a:r>
+              <a:rPr lang="ru-RU" sz="1600" dirty="0">
+                <a:latin typeface="Arial" panose="020B0604020202020204" pitchFamily="34" charset="0"/>
+                <a:cs typeface="Arial" panose="020B0604020202020204" pitchFamily="34" charset="0"/>
+              </a:rPr>
+              <a:t>Стандартная система сборки (</a:t>
+            </a:r>
+            <a:r>
+              <a:rPr lang="en-US" sz="1600" dirty="0">
+                <a:latin typeface="Arial" panose="020B0604020202020204" pitchFamily="34" charset="0"/>
+                <a:cs typeface="Arial" panose="020B0604020202020204" pitchFamily="34" charset="0"/>
+              </a:rPr>
+              <a:t>Maven </a:t>
+            </a:r>
+            <a:r>
+              <a:rPr lang="ru-RU" sz="1600" dirty="0">
+                <a:latin typeface="Arial" panose="020B0604020202020204" pitchFamily="34" charset="0"/>
+                <a:cs typeface="Arial" panose="020B0604020202020204" pitchFamily="34" charset="0"/>
+              </a:rPr>
+              <a:t>или </a:t>
+            </a:r>
+            <a:r>
+              <a:rPr lang="en-US" sz="1600" dirty="0">
+                <a:latin typeface="Arial" panose="020B0604020202020204" pitchFamily="34" charset="0"/>
+                <a:cs typeface="Arial" panose="020B0604020202020204" pitchFamily="34" charset="0"/>
+              </a:rPr>
+              <a:t>Gradle)</a:t>
+            </a:r>
+            <a:endParaRPr lang="ru-RU" sz="1600" dirty="0">
               <a:latin typeface="Arial" panose="020B0604020202020204" pitchFamily="34" charset="0"/>
               <a:cs typeface="Arial" panose="020B0604020202020204" pitchFamily="34" charset="0"/>
             </a:endParaRPr>
+          </a:p>
+          <a:p>
+            <a:pPr lvl="1"/>
+            <a:r>
+              <a:rPr lang="ru-RU" sz="1600" dirty="0">
+                <a:latin typeface="Arial" panose="020B0604020202020204" pitchFamily="34" charset="0"/>
+                <a:cs typeface="Arial" panose="020B0604020202020204" pitchFamily="34" charset="0"/>
+              </a:rPr>
+              <a:t>Юнит-тесты — обязательно со 2-го демо-дня, желательно с 1-го</a:t>
+            </a:r>
+          </a:p>
+          <a:p>
+            <a:pPr lvl="1"/>
+            <a:r>
+              <a:rPr lang="ru-RU" sz="1600" dirty="0">
+                <a:latin typeface="Arial" panose="020B0604020202020204" pitchFamily="34" charset="0"/>
+                <a:cs typeface="Arial" panose="020B0604020202020204" pitchFamily="34" charset="0"/>
+              </a:rPr>
+              <a:t>Исполняемый артефакт (</a:t>
+            </a:r>
+            <a:r>
+              <a:rPr lang="en-US" sz="1600" dirty="0">
+                <a:latin typeface="Arial" panose="020B0604020202020204" pitchFamily="34" charset="0"/>
+                <a:cs typeface="Arial" panose="020B0604020202020204" pitchFamily="34" charset="0"/>
+              </a:rPr>
+              <a:t>Docker, </a:t>
+            </a:r>
+            <a:r>
+              <a:rPr lang="en-US" sz="1600" dirty="0" err="1">
+                <a:latin typeface="Arial" panose="020B0604020202020204" pitchFamily="34" charset="0"/>
+                <a:cs typeface="Arial" panose="020B0604020202020204" pitchFamily="34" charset="0"/>
+              </a:rPr>
+              <a:t>GraalVM</a:t>
+            </a:r>
+            <a:r>
+              <a:rPr lang="en-US" sz="1600" dirty="0">
+                <a:latin typeface="Arial" panose="020B0604020202020204" pitchFamily="34" charset="0"/>
+                <a:cs typeface="Arial" panose="020B0604020202020204" pitchFamily="34" charset="0"/>
+              </a:rPr>
+              <a:t> native-image, </a:t>
+            </a:r>
+            <a:r>
+              <a:rPr lang="en-US" sz="1600" dirty="0" err="1">
+                <a:latin typeface="Arial" panose="020B0604020202020204" pitchFamily="34" charset="0"/>
+                <a:cs typeface="Arial" panose="020B0604020202020204" pitchFamily="34" charset="0"/>
+              </a:rPr>
+              <a:t>jlink</a:t>
+            </a:r>
+            <a:r>
+              <a:rPr lang="en-US" sz="1600" dirty="0">
+                <a:latin typeface="Arial" panose="020B0604020202020204" pitchFamily="34" charset="0"/>
+                <a:cs typeface="Arial" panose="020B0604020202020204" pitchFamily="34" charset="0"/>
+              </a:rPr>
+              <a:t> image) — </a:t>
+            </a:r>
+            <a:r>
+              <a:rPr lang="ru-RU" sz="1600" dirty="0">
+                <a:latin typeface="Arial" panose="020B0604020202020204" pitchFamily="34" charset="0"/>
+                <a:cs typeface="Arial" panose="020B0604020202020204" pitchFamily="34" charset="0"/>
+              </a:rPr>
+              <a:t>обязательно с 3-го демо-дня. До этого, </a:t>
+            </a:r>
+            <a:r>
+              <a:rPr lang="ru-RU" sz="1600" b="1" dirty="0">
+                <a:latin typeface="Arial" panose="020B0604020202020204" pitchFamily="34" charset="0"/>
+                <a:cs typeface="Arial" panose="020B0604020202020204" pitchFamily="34" charset="0"/>
+              </a:rPr>
+              <a:t>можно</a:t>
+            </a:r>
+            <a:r>
+              <a:rPr lang="ru-RU" sz="1600" dirty="0">
+                <a:latin typeface="Arial" panose="020B0604020202020204" pitchFamily="34" charset="0"/>
+                <a:cs typeface="Arial" panose="020B0604020202020204" pitchFamily="34" charset="0"/>
+              </a:rPr>
+              <a:t> исполняемый </a:t>
+            </a:r>
+            <a:r>
+              <a:rPr lang="en-US" sz="1600" dirty="0">
+                <a:latin typeface="Arial" panose="020B0604020202020204" pitchFamily="34" charset="0"/>
+                <a:cs typeface="Arial" panose="020B0604020202020204" pitchFamily="34" charset="0"/>
+              </a:rPr>
+              <a:t>JAR-</a:t>
+            </a:r>
+            <a:r>
+              <a:rPr lang="ru-RU" sz="1600" dirty="0">
+                <a:latin typeface="Arial" panose="020B0604020202020204" pitchFamily="34" charset="0"/>
+                <a:cs typeface="Arial" panose="020B0604020202020204" pitchFamily="34" charset="0"/>
+              </a:rPr>
+              <a:t>файл + запускать руками/скриптом (</a:t>
+            </a:r>
+            <a:r>
+              <a:rPr lang="en-US" sz="1600" dirty="0">
+                <a:latin typeface="Arial" panose="020B0604020202020204" pitchFamily="34" charset="0"/>
+                <a:cs typeface="Arial" panose="020B0604020202020204" pitchFamily="34" charset="0"/>
+              </a:rPr>
+              <a:t>java -jar ...)</a:t>
+            </a:r>
+            <a:endParaRPr lang="ru-RU" sz="1600" dirty="0">
+              <a:latin typeface="Arial" panose="020B0604020202020204" pitchFamily="34" charset="0"/>
+              <a:cs typeface="Arial" panose="020B0604020202020204" pitchFamily="34" charset="0"/>
+            </a:endParaRPr>
+          </a:p>
+          <a:p>
+            <a:pPr lvl="1"/>
+            <a:r>
+              <a:rPr lang="ru-RU" sz="1600" dirty="0">
+                <a:latin typeface="Arial" panose="020B0604020202020204" pitchFamily="34" charset="0"/>
+                <a:cs typeface="Arial" panose="020B0604020202020204" pitchFamily="34" charset="0"/>
+              </a:rPr>
+              <a:t>Сборка и деплой в системе непрерывной интеграции (</a:t>
+            </a:r>
+            <a:r>
+              <a:rPr lang="en-US" sz="1600" dirty="0">
+                <a:latin typeface="Arial" panose="020B0604020202020204" pitchFamily="34" charset="0"/>
+                <a:cs typeface="Arial" panose="020B0604020202020204" pitchFamily="34" charset="0"/>
+              </a:rPr>
+              <a:t>GitHub Actions) — </a:t>
+            </a:r>
+            <a:r>
+              <a:rPr lang="ru-RU" sz="1600" dirty="0">
+                <a:latin typeface="Arial" panose="020B0604020202020204" pitchFamily="34" charset="0"/>
+                <a:cs typeface="Arial" panose="020B0604020202020204" pitchFamily="34" charset="0"/>
+              </a:rPr>
+              <a:t>к 4-му демо-дню</a:t>
+            </a:r>
+          </a:p>
+          <a:p>
+            <a:r>
+              <a:rPr lang="ru-RU" sz="2000" b="1" dirty="0">
+                <a:latin typeface="Arial" panose="020B0604020202020204" pitchFamily="34" charset="0"/>
+                <a:cs typeface="Arial" panose="020B0604020202020204" pitchFamily="34" charset="0"/>
+              </a:rPr>
+              <a:t>Можно</a:t>
+            </a:r>
+            <a:r>
+              <a:rPr lang="ru-RU" sz="2000" dirty="0">
+                <a:latin typeface="Arial" panose="020B0604020202020204" pitchFamily="34" charset="0"/>
+                <a:cs typeface="Arial" panose="020B0604020202020204" pitchFamily="34" charset="0"/>
+              </a:rPr>
+              <a:t>:</a:t>
+            </a:r>
+          </a:p>
+          <a:p>
+            <a:pPr lvl="1"/>
+            <a:r>
+              <a:rPr lang="ru-RU" sz="1600" dirty="0">
+                <a:latin typeface="Arial" panose="020B0604020202020204" pitchFamily="34" charset="0"/>
+                <a:cs typeface="Arial" panose="020B0604020202020204" pitchFamily="34" charset="0"/>
+              </a:rPr>
+              <a:t>Библиотеки, напр. </a:t>
+            </a:r>
+            <a:r>
+              <a:rPr lang="en-US" sz="1600" dirty="0">
+                <a:latin typeface="Arial" panose="020B0604020202020204" pitchFamily="34" charset="0"/>
+                <a:cs typeface="Arial" panose="020B0604020202020204" pitchFamily="34" charset="0"/>
+              </a:rPr>
+              <a:t>Google Guava</a:t>
+            </a:r>
+            <a:endParaRPr lang="ru-RU" sz="1600" dirty="0">
+              <a:latin typeface="Arial" panose="020B0604020202020204" pitchFamily="34" charset="0"/>
+              <a:cs typeface="Arial" panose="020B0604020202020204" pitchFamily="34" charset="0"/>
+            </a:endParaRPr>
+          </a:p>
+          <a:p>
+            <a:pPr lvl="2"/>
+            <a:r>
+              <a:rPr lang="ru-RU" sz="1600" dirty="0">
+                <a:latin typeface="Arial" panose="020B0604020202020204" pitchFamily="34" charset="0"/>
+                <a:cs typeface="Arial" panose="020B0604020202020204" pitchFamily="34" charset="0"/>
+              </a:rPr>
+              <a:t>Можно даже библиотеку, которую сделает соседняя команда, но преподаватель должен об этом знать заранее</a:t>
+            </a:r>
+          </a:p>
+          <a:p>
+            <a:pPr lvl="1"/>
+            <a:r>
+              <a:rPr lang="ru-RU" sz="1600" dirty="0">
+                <a:latin typeface="Arial" panose="020B0604020202020204" pitchFamily="34" charset="0"/>
+                <a:cs typeface="Arial" panose="020B0604020202020204" pitchFamily="34" charset="0"/>
+              </a:rPr>
+              <a:t>Паттерны, абстракции (без фанатизма :-))</a:t>
+            </a:r>
+          </a:p>
+          <a:p>
+            <a:r>
+              <a:rPr lang="ru-RU" sz="2000" b="1" u="sng" dirty="0">
+                <a:latin typeface="Arial" panose="020B0604020202020204" pitchFamily="34" charset="0"/>
+                <a:cs typeface="Arial" panose="020B0604020202020204" pitchFamily="34" charset="0"/>
+              </a:rPr>
+              <a:t>Нельзя</a:t>
+            </a:r>
+            <a:r>
+              <a:rPr lang="ru-RU" sz="2000" b="1" dirty="0">
+                <a:latin typeface="Arial" panose="020B0604020202020204" pitchFamily="34" charset="0"/>
+                <a:cs typeface="Arial" panose="020B0604020202020204" pitchFamily="34" charset="0"/>
+              </a:rPr>
+              <a:t>:</a:t>
+            </a:r>
+          </a:p>
+          <a:p>
+            <a:pPr lvl="1"/>
+            <a:r>
+              <a:rPr lang="ru-RU" sz="1600" dirty="0">
+                <a:latin typeface="Arial" panose="020B0604020202020204" pitchFamily="34" charset="0"/>
+                <a:cs typeface="Arial" panose="020B0604020202020204" pitchFamily="34" charset="0"/>
+              </a:rPr>
+              <a:t>Тривиальная «обёртка» над готовой внешней библиотекой, программой, веб-сервисом...</a:t>
+            </a:r>
+          </a:p>
+          <a:p>
+            <a:pPr lvl="1"/>
+            <a:r>
+              <a:rPr lang="ru-RU" sz="1600" dirty="0">
+                <a:latin typeface="Arial" panose="020B0604020202020204" pitchFamily="34" charset="0"/>
+                <a:cs typeface="Arial" panose="020B0604020202020204" pitchFamily="34" charset="0"/>
+              </a:rPr>
+              <a:t>Любая форма плагиата, в т.ч. креативно переработать студенческие проекты прошлого года</a:t>
+            </a:r>
           </a:p>
         </p:txBody>
       </p:sp>
       <p:pic>
         <p:nvPicPr>
-          <p:cNvPr id="8193" name="Picture 1" descr="page8image42820608">
+          <p:cNvPr id="10241" name="Picture 1" descr="page8image42820608">
             <a:extLst>
               <a:ext uri="{FF2B5EF4-FFF2-40B4-BE49-F238E27FC236}">
-                <a16:creationId xmlns:a16="http://schemas.microsoft.com/office/drawing/2014/main" id="{C2A53B86-885A-1BEB-89C9-967F2A7C7037}"/>
+                <a16:creationId xmlns:a16="http://schemas.microsoft.com/office/drawing/2014/main" id="{5108C484-F0F1-7B49-A388-B567EFFDAB89}"/>
               </a:ext>
             </a:extLst>
           </p:cNvPr>
@@ -5978,422 +4296,6 @@
           </a:extLst>
         </p:spPr>
       </p:pic>
-      <p:pic>
-        <p:nvPicPr>
-          <p:cNvPr id="8194" name="Picture 4" descr="page8image42820608">
-            <a:extLst>
-              <a:ext uri="{FF2B5EF4-FFF2-40B4-BE49-F238E27FC236}">
-                <a16:creationId xmlns:a16="http://schemas.microsoft.com/office/drawing/2014/main" id="{AED7D431-E9B6-1A09-733B-E30840BF3F89}"/>
-              </a:ext>
-            </a:extLst>
-          </p:cNvPr>
-          <p:cNvPicPr>
-            <a:picLocks noChangeAspect="1" noChangeArrowheads="1"/>
-          </p:cNvPicPr>
-          <p:nvPr/>
-        </p:nvPicPr>
-        <p:blipFill>
-          <a:blip r:embed="rId2">
-            <a:extLst>
-              <a:ext uri="{28A0092B-C50C-407E-A947-70E740481C1C}">
-                <a14:useLocalDpi xmlns:a14="http://schemas.microsoft.com/office/drawing/2010/main" val="0"/>
-              </a:ext>
-            </a:extLst>
-          </a:blip>
-          <a:srcRect/>
-          <a:stretch>
-            <a:fillRect/>
-          </a:stretch>
-        </p:blipFill>
-        <p:spPr bwMode="auto">
-          <a:xfrm>
-            <a:off x="-10274" y="0"/>
-            <a:ext cx="9067800" cy="952500"/>
-          </a:xfrm>
-          <a:prstGeom prst="rect">
-            <a:avLst/>
-          </a:prstGeom>
-          <a:noFill/>
-          <a:extLst>
-            <a:ext uri="{909E8E84-426E-40DD-AFC4-6F175D3DCCD1}">
-              <a14:hiddenFill xmlns:a14="http://schemas.microsoft.com/office/drawing/2010/main">
-                <a:solidFill>
-                  <a:srgbClr val="FFFFFF"/>
-                </a:solidFill>
-              </a14:hiddenFill>
-            </a:ext>
-          </a:extLst>
-        </p:spPr>
-      </p:pic>
-    </p:spTree>
-    <p:extLst>
-      <p:ext uri="{BB962C8B-B14F-4D97-AF65-F5344CB8AC3E}">
-        <p14:creationId xmlns:p14="http://schemas.microsoft.com/office/powerpoint/2010/main" val="2249161967"/>
-      </p:ext>
-    </p:extLst>
-  </p:cSld>
-  <p:clrMapOvr>
-    <a:masterClrMapping/>
-  </p:clrMapOvr>
-</p:sld>
-</file>
-
-<file path=ppt/slides/slide11.xml><?xml version="1.0" encoding="utf-8"?>
-<p:sld xmlns:a="http://schemas.openxmlformats.org/drawingml/2006/main" xmlns:r="http://schemas.openxmlformats.org/officeDocument/2006/relationships" xmlns:p="http://schemas.openxmlformats.org/presentationml/2006/main">
-  <p:cSld>
-    <p:spTree>
-      <p:nvGrpSpPr>
-        <p:cNvPr id="1" name=""/>
-        <p:cNvGrpSpPr/>
-        <p:nvPr/>
-      </p:nvGrpSpPr>
-      <p:grpSpPr>
-        <a:xfrm>
-          <a:off x="0" y="0"/>
-          <a:ext cx="0" cy="0"/>
-          <a:chOff x="0" y="0"/>
-          <a:chExt cx="0" cy="0"/>
-        </a:xfrm>
-      </p:grpSpPr>
-      <p:sp>
-        <p:nvSpPr>
-          <p:cNvPr id="2" name="Title 1">
-            <a:extLst>
-              <a:ext uri="{FF2B5EF4-FFF2-40B4-BE49-F238E27FC236}">
-                <a16:creationId xmlns:a16="http://schemas.microsoft.com/office/drawing/2014/main" id="{1F95CC1A-3F70-23D6-7F89-0DFA6A0FA11F}"/>
-              </a:ext>
-            </a:extLst>
-          </p:cNvPr>
-          <p:cNvSpPr>
-            <a:spLocks noGrp="1"/>
-          </p:cNvSpPr>
-          <p:nvPr>
-            <p:ph type="title"/>
-          </p:nvPr>
-        </p:nvSpPr>
-        <p:spPr>
-          <a:xfrm>
-            <a:off x="2636605" y="204786"/>
-            <a:ext cx="6918789" cy="952501"/>
-          </a:xfrm>
-        </p:spPr>
-        <p:txBody>
-          <a:bodyPr/>
-          <a:lstStyle/>
-          <a:p>
-            <a:pPr algn="ctr"/>
-            <a:r>
-              <a:rPr lang="ru-RU" b="1" dirty="0">
-                <a:latin typeface="Arial" panose="020B0604020202020204" pitchFamily="34" charset="0"/>
-                <a:cs typeface="Arial" panose="020B0604020202020204" pitchFamily="34" charset="0"/>
-              </a:rPr>
-              <a:t>Командный проект (2)</a:t>
-            </a:r>
-            <a:endParaRPr lang="en-US" b="1" dirty="0">
-              <a:latin typeface="Arial" panose="020B0604020202020204" pitchFamily="34" charset="0"/>
-              <a:cs typeface="Arial" panose="020B0604020202020204" pitchFamily="34" charset="0"/>
-            </a:endParaRPr>
-          </a:p>
-        </p:txBody>
-      </p:sp>
-      <p:sp>
-        <p:nvSpPr>
-          <p:cNvPr id="3" name="Content Placeholder 2">
-            <a:extLst>
-              <a:ext uri="{FF2B5EF4-FFF2-40B4-BE49-F238E27FC236}">
-                <a16:creationId xmlns:a16="http://schemas.microsoft.com/office/drawing/2014/main" id="{DC591F69-11FB-94FB-D83A-FE1973BA79E7}"/>
-              </a:ext>
-            </a:extLst>
-          </p:cNvPr>
-          <p:cNvSpPr>
-            <a:spLocks noGrp="1"/>
-          </p:cNvSpPr>
-          <p:nvPr>
-            <p:ph idx="1"/>
-          </p:nvPr>
-        </p:nvSpPr>
-        <p:spPr>
-          <a:xfrm>
-            <a:off x="838200" y="1273996"/>
-            <a:ext cx="10935984" cy="4902967"/>
-          </a:xfrm>
-        </p:spPr>
-        <p:txBody>
-          <a:bodyPr>
-            <a:noAutofit/>
-          </a:bodyPr>
-          <a:lstStyle/>
-          <a:p>
-            <a:r>
-              <a:rPr lang="ru-RU" sz="2000" b="1" dirty="0">
-                <a:latin typeface="Arial" panose="020B0604020202020204" pitchFamily="34" charset="0"/>
-                <a:cs typeface="Arial" panose="020B0604020202020204" pitchFamily="34" charset="0"/>
-              </a:rPr>
-              <a:t>Обязательно</a:t>
-            </a:r>
-            <a:r>
-              <a:rPr lang="ru-RU" sz="2000" dirty="0">
-                <a:latin typeface="Arial" panose="020B0604020202020204" pitchFamily="34" charset="0"/>
-                <a:cs typeface="Arial" panose="020B0604020202020204" pitchFamily="34" charset="0"/>
-              </a:rPr>
-              <a:t>:</a:t>
-            </a:r>
-          </a:p>
-          <a:p>
-            <a:pPr lvl="1"/>
-            <a:r>
-              <a:rPr lang="ru-RU" sz="1600" dirty="0">
-                <a:latin typeface="Arial" panose="020B0604020202020204" pitchFamily="34" charset="0"/>
-                <a:cs typeface="Arial" panose="020B0604020202020204" pitchFamily="34" charset="0"/>
-              </a:rPr>
-              <a:t>Стандартная система сборки (</a:t>
-            </a:r>
-            <a:r>
-              <a:rPr lang="en-US" sz="1600" dirty="0">
-                <a:latin typeface="Arial" panose="020B0604020202020204" pitchFamily="34" charset="0"/>
-                <a:cs typeface="Arial" panose="020B0604020202020204" pitchFamily="34" charset="0"/>
-              </a:rPr>
-              <a:t>Maven </a:t>
-            </a:r>
-            <a:r>
-              <a:rPr lang="ru-RU" sz="1600" dirty="0">
-                <a:latin typeface="Arial" panose="020B0604020202020204" pitchFamily="34" charset="0"/>
-                <a:cs typeface="Arial" panose="020B0604020202020204" pitchFamily="34" charset="0"/>
-              </a:rPr>
-              <a:t>или </a:t>
-            </a:r>
-            <a:r>
-              <a:rPr lang="en-US" sz="1600" dirty="0">
-                <a:latin typeface="Arial" panose="020B0604020202020204" pitchFamily="34" charset="0"/>
-                <a:cs typeface="Arial" panose="020B0604020202020204" pitchFamily="34" charset="0"/>
-              </a:rPr>
-              <a:t>Gradle)</a:t>
-            </a:r>
-            <a:endParaRPr lang="ru-RU" sz="1600" dirty="0">
-              <a:latin typeface="Arial" panose="020B0604020202020204" pitchFamily="34" charset="0"/>
-              <a:cs typeface="Arial" panose="020B0604020202020204" pitchFamily="34" charset="0"/>
-            </a:endParaRPr>
-          </a:p>
-          <a:p>
-            <a:pPr lvl="1"/>
-            <a:r>
-              <a:rPr lang="ru-RU" sz="1600" dirty="0">
-                <a:latin typeface="Arial" panose="020B0604020202020204" pitchFamily="34" charset="0"/>
-                <a:cs typeface="Arial" panose="020B0604020202020204" pitchFamily="34" charset="0"/>
-              </a:rPr>
-              <a:t>Юнит-тесты — обязательно со 2-го демо-дня, желательно с 1-го</a:t>
-            </a:r>
-          </a:p>
-          <a:p>
-            <a:pPr lvl="1"/>
-            <a:r>
-              <a:rPr lang="ru-RU" sz="1600" dirty="0">
-                <a:latin typeface="Arial" panose="020B0604020202020204" pitchFamily="34" charset="0"/>
-                <a:cs typeface="Arial" panose="020B0604020202020204" pitchFamily="34" charset="0"/>
-              </a:rPr>
-              <a:t>Исполняемый артефакт (</a:t>
-            </a:r>
-            <a:r>
-              <a:rPr lang="en-US" sz="1600" dirty="0">
-                <a:latin typeface="Arial" panose="020B0604020202020204" pitchFamily="34" charset="0"/>
-                <a:cs typeface="Arial" panose="020B0604020202020204" pitchFamily="34" charset="0"/>
-              </a:rPr>
-              <a:t>Docker, </a:t>
-            </a:r>
-            <a:r>
-              <a:rPr lang="en-US" sz="1600" dirty="0" err="1">
-                <a:latin typeface="Arial" panose="020B0604020202020204" pitchFamily="34" charset="0"/>
-                <a:cs typeface="Arial" panose="020B0604020202020204" pitchFamily="34" charset="0"/>
-              </a:rPr>
-              <a:t>GraalVM</a:t>
-            </a:r>
-            <a:r>
-              <a:rPr lang="en-US" sz="1600" dirty="0">
-                <a:latin typeface="Arial" panose="020B0604020202020204" pitchFamily="34" charset="0"/>
-                <a:cs typeface="Arial" panose="020B0604020202020204" pitchFamily="34" charset="0"/>
-              </a:rPr>
-              <a:t> native-image, </a:t>
-            </a:r>
-            <a:r>
-              <a:rPr lang="en-US" sz="1600" dirty="0" err="1">
-                <a:latin typeface="Arial" panose="020B0604020202020204" pitchFamily="34" charset="0"/>
-                <a:cs typeface="Arial" panose="020B0604020202020204" pitchFamily="34" charset="0"/>
-              </a:rPr>
-              <a:t>jlink</a:t>
-            </a:r>
-            <a:r>
-              <a:rPr lang="en-US" sz="1600" dirty="0">
-                <a:latin typeface="Arial" panose="020B0604020202020204" pitchFamily="34" charset="0"/>
-                <a:cs typeface="Arial" panose="020B0604020202020204" pitchFamily="34" charset="0"/>
-              </a:rPr>
-              <a:t> image) — </a:t>
-            </a:r>
-            <a:r>
-              <a:rPr lang="ru-RU" sz="1600" dirty="0">
-                <a:latin typeface="Arial" panose="020B0604020202020204" pitchFamily="34" charset="0"/>
-                <a:cs typeface="Arial" panose="020B0604020202020204" pitchFamily="34" charset="0"/>
-              </a:rPr>
-              <a:t>обязательно с 3-го демо-дня. До этого, </a:t>
-            </a:r>
-            <a:r>
-              <a:rPr lang="ru-RU" sz="1600" b="1" dirty="0">
-                <a:latin typeface="Arial" panose="020B0604020202020204" pitchFamily="34" charset="0"/>
-                <a:cs typeface="Arial" panose="020B0604020202020204" pitchFamily="34" charset="0"/>
-              </a:rPr>
-              <a:t>можно</a:t>
-            </a:r>
-            <a:r>
-              <a:rPr lang="ru-RU" sz="1600" dirty="0">
-                <a:latin typeface="Arial" panose="020B0604020202020204" pitchFamily="34" charset="0"/>
-                <a:cs typeface="Arial" panose="020B0604020202020204" pitchFamily="34" charset="0"/>
-              </a:rPr>
-              <a:t> исполняемый </a:t>
-            </a:r>
-            <a:r>
-              <a:rPr lang="en-US" sz="1600" dirty="0">
-                <a:latin typeface="Arial" panose="020B0604020202020204" pitchFamily="34" charset="0"/>
-                <a:cs typeface="Arial" panose="020B0604020202020204" pitchFamily="34" charset="0"/>
-              </a:rPr>
-              <a:t>JAR-</a:t>
-            </a:r>
-            <a:r>
-              <a:rPr lang="ru-RU" sz="1600" dirty="0">
-                <a:latin typeface="Arial" panose="020B0604020202020204" pitchFamily="34" charset="0"/>
-                <a:cs typeface="Arial" panose="020B0604020202020204" pitchFamily="34" charset="0"/>
-              </a:rPr>
-              <a:t>файл + запускать руками/скриптом (</a:t>
-            </a:r>
-            <a:r>
-              <a:rPr lang="en-US" sz="1600" dirty="0">
-                <a:latin typeface="Arial" panose="020B0604020202020204" pitchFamily="34" charset="0"/>
-                <a:cs typeface="Arial" panose="020B0604020202020204" pitchFamily="34" charset="0"/>
-              </a:rPr>
-              <a:t>java -jar ...)</a:t>
-            </a:r>
-            <a:endParaRPr lang="ru-RU" sz="1600" dirty="0">
-              <a:latin typeface="Arial" panose="020B0604020202020204" pitchFamily="34" charset="0"/>
-              <a:cs typeface="Arial" panose="020B0604020202020204" pitchFamily="34" charset="0"/>
-            </a:endParaRPr>
-          </a:p>
-          <a:p>
-            <a:pPr lvl="1"/>
-            <a:r>
-              <a:rPr lang="ru-RU" sz="1600" dirty="0">
-                <a:latin typeface="Arial" panose="020B0604020202020204" pitchFamily="34" charset="0"/>
-                <a:cs typeface="Arial" panose="020B0604020202020204" pitchFamily="34" charset="0"/>
-              </a:rPr>
-              <a:t>Сборка и деплой в системе непрерывной интеграции (</a:t>
-            </a:r>
-            <a:r>
-              <a:rPr lang="en-US" sz="1600" dirty="0">
-                <a:latin typeface="Arial" panose="020B0604020202020204" pitchFamily="34" charset="0"/>
-                <a:cs typeface="Arial" panose="020B0604020202020204" pitchFamily="34" charset="0"/>
-              </a:rPr>
-              <a:t>GitHub Actions) — </a:t>
-            </a:r>
-            <a:r>
-              <a:rPr lang="ru-RU" sz="1600" dirty="0">
-                <a:latin typeface="Arial" panose="020B0604020202020204" pitchFamily="34" charset="0"/>
-                <a:cs typeface="Arial" panose="020B0604020202020204" pitchFamily="34" charset="0"/>
-              </a:rPr>
-              <a:t>к 4-му демо-дню</a:t>
-            </a:r>
-          </a:p>
-          <a:p>
-            <a:r>
-              <a:rPr lang="ru-RU" sz="2000" b="1" dirty="0">
-                <a:latin typeface="Arial" panose="020B0604020202020204" pitchFamily="34" charset="0"/>
-                <a:cs typeface="Arial" panose="020B0604020202020204" pitchFamily="34" charset="0"/>
-              </a:rPr>
-              <a:t>Можно</a:t>
-            </a:r>
-            <a:r>
-              <a:rPr lang="ru-RU" sz="2000" dirty="0">
-                <a:latin typeface="Arial" panose="020B0604020202020204" pitchFamily="34" charset="0"/>
-                <a:cs typeface="Arial" panose="020B0604020202020204" pitchFamily="34" charset="0"/>
-              </a:rPr>
-              <a:t>:</a:t>
-            </a:r>
-          </a:p>
-          <a:p>
-            <a:pPr lvl="1"/>
-            <a:r>
-              <a:rPr lang="ru-RU" sz="1600" dirty="0">
-                <a:latin typeface="Arial" panose="020B0604020202020204" pitchFamily="34" charset="0"/>
-                <a:cs typeface="Arial" panose="020B0604020202020204" pitchFamily="34" charset="0"/>
-              </a:rPr>
-              <a:t>Библиотеки, напр. </a:t>
-            </a:r>
-            <a:r>
-              <a:rPr lang="en-US" sz="1600" dirty="0">
-                <a:latin typeface="Arial" panose="020B0604020202020204" pitchFamily="34" charset="0"/>
-                <a:cs typeface="Arial" panose="020B0604020202020204" pitchFamily="34" charset="0"/>
-              </a:rPr>
-              <a:t>Google Guava</a:t>
-            </a:r>
-            <a:endParaRPr lang="ru-RU" sz="1600" dirty="0">
-              <a:latin typeface="Arial" panose="020B0604020202020204" pitchFamily="34" charset="0"/>
-              <a:cs typeface="Arial" panose="020B0604020202020204" pitchFamily="34" charset="0"/>
-            </a:endParaRPr>
-          </a:p>
-          <a:p>
-            <a:pPr lvl="2"/>
-            <a:r>
-              <a:rPr lang="ru-RU" sz="1600" dirty="0">
-                <a:latin typeface="Arial" panose="020B0604020202020204" pitchFamily="34" charset="0"/>
-                <a:cs typeface="Arial" panose="020B0604020202020204" pitchFamily="34" charset="0"/>
-              </a:rPr>
-              <a:t>Можно даже библиотеку, которую сделает соседняя команда, но преподаватель должен об этом знать заранее</a:t>
-            </a:r>
-          </a:p>
-          <a:p>
-            <a:pPr lvl="1"/>
-            <a:r>
-              <a:rPr lang="ru-RU" sz="1600" dirty="0">
-                <a:latin typeface="Arial" panose="020B0604020202020204" pitchFamily="34" charset="0"/>
-                <a:cs typeface="Arial" panose="020B0604020202020204" pitchFamily="34" charset="0"/>
-              </a:rPr>
-              <a:t>Паттерны, абстракции (без фанатизма :-))</a:t>
-            </a:r>
-          </a:p>
-          <a:p>
-            <a:r>
-              <a:rPr lang="ru-RU" sz="2000" b="1" u="sng" dirty="0">
-                <a:latin typeface="Arial" panose="020B0604020202020204" pitchFamily="34" charset="0"/>
-                <a:cs typeface="Arial" panose="020B0604020202020204" pitchFamily="34" charset="0"/>
-              </a:rPr>
-              <a:t>Нельзя</a:t>
-            </a:r>
-            <a:r>
-              <a:rPr lang="ru-RU" sz="2000" b="1" dirty="0">
-                <a:latin typeface="Arial" panose="020B0604020202020204" pitchFamily="34" charset="0"/>
-                <a:cs typeface="Arial" panose="020B0604020202020204" pitchFamily="34" charset="0"/>
-              </a:rPr>
-              <a:t>:</a:t>
-            </a:r>
-          </a:p>
-          <a:p>
-            <a:pPr lvl="1"/>
-            <a:r>
-              <a:rPr lang="ru-RU" sz="1600" dirty="0">
-                <a:latin typeface="Arial" panose="020B0604020202020204" pitchFamily="34" charset="0"/>
-                <a:cs typeface="Arial" panose="020B0604020202020204" pitchFamily="34" charset="0"/>
-              </a:rPr>
-              <a:t>Тривиальная «обёртка» над готовой внешней библиотекой, программой, веб-сервисом...</a:t>
-            </a:r>
-          </a:p>
-          <a:p>
-            <a:pPr lvl="1"/>
-            <a:r>
-              <a:rPr lang="ru-RU" sz="1600" dirty="0">
-                <a:latin typeface="Arial" panose="020B0604020202020204" pitchFamily="34" charset="0"/>
-                <a:cs typeface="Arial" panose="020B0604020202020204" pitchFamily="34" charset="0"/>
-              </a:rPr>
-              <a:t>Любая форма плагиата, в т.ч. креативно переработать студенческие проекты прошлого года</a:t>
-            </a:r>
-          </a:p>
-        </p:txBody>
-      </p:sp>
     </p:spTree>
     <p:extLst>
       <p:ext uri="{BB962C8B-B14F-4D97-AF65-F5344CB8AC3E}">
@@ -6407,7 +4309,7 @@
 </p:sld>
 </file>
 
-<file path=ppt/slides/slide12.xml><?xml version="1.0" encoding="utf-8"?>
+<file path=ppt/slides/slide11.xml><?xml version="1.0" encoding="utf-8"?>
 <p:sld xmlns:a="http://schemas.openxmlformats.org/drawingml/2006/main" xmlns:r="http://schemas.openxmlformats.org/officeDocument/2006/relationships" xmlns:p="http://schemas.openxmlformats.org/presentationml/2006/main">
   <p:cSld>
     <p:spTree>
@@ -10373,7 +8275,7 @@
           <p:nvPr/>
         </p:nvPicPr>
         <p:blipFill>
-          <a:blip r:embed="rId3">
+          <a:blip r:embed="rId2">
             <a:extLst>
               <a:ext uri="{28A0092B-C50C-407E-A947-70E740481C1C}">
                 <a14:useLocalDpi xmlns:a14="http://schemas.microsoft.com/office/drawing/2010/main" val="0"/>
@@ -10420,7 +8322,7 @@
         <p:spPr>
           <a:xfrm>
             <a:off x="336477" y="766934"/>
-            <a:ext cx="11550723" cy="5383653"/>
+            <a:ext cx="11550723" cy="5678606"/>
           </a:xfrm>
           <a:prstGeom prst="rect">
             <a:avLst/>
@@ -10978,18 +8880,19 @@
               <a:t>): </a:t>
             </a:r>
             <a:r>
-              <a:rPr lang="ru-RU" sz="1600" dirty="0">
-                <a:latin typeface="Arial" panose="020B0604020202020204" pitchFamily="34" charset="0"/>
-                <a:cs typeface="Arial" panose="020B0604020202020204" pitchFamily="34" charset="0"/>
-              </a:rPr>
-              <a:t>будут лежать на </a:t>
+              <a:rPr lang="en-US" sz="1600" dirty="0">
+                <a:latin typeface="Arial" panose="020B0604020202020204" pitchFamily="34" charset="0"/>
+                <a:cs typeface="Arial" panose="020B0604020202020204" pitchFamily="34" charset="0"/>
+                <a:hlinkClick r:id="rId3"/>
+              </a:rPr>
+              <a:t>https://github.com/albina-astr/hse-java-spring-2023/blob/master/project-ideas.md</a:t>
             </a:r>
             <a:r>
               <a:rPr lang="en-GB" sz="1600" dirty="0">
                 <a:latin typeface="Arial" panose="020B0604020202020204" pitchFamily="34" charset="0"/>
                 <a:cs typeface="Arial" panose="020B0604020202020204" pitchFamily="34" charset="0"/>
               </a:rPr>
-              <a:t>GitHub. </a:t>
+              <a:t>. </a:t>
             </a:r>
             <a:r>
               <a:rPr lang="en-US" sz="1600" dirty="0">
@@ -12389,6 +10292,147 @@
           </a:p>
         </p:txBody>
       </p:sp>
+      <p:pic>
+        <p:nvPicPr>
+          <p:cNvPr id="7169" name="Picture 1" descr="page8image42820608">
+            <a:extLst>
+              <a:ext uri="{FF2B5EF4-FFF2-40B4-BE49-F238E27FC236}">
+                <a16:creationId xmlns:a16="http://schemas.microsoft.com/office/drawing/2014/main" id="{B806F369-2DDC-B449-82D7-817A7F0E24C1}"/>
+              </a:ext>
+            </a:extLst>
+          </p:cNvPr>
+          <p:cNvPicPr>
+            <a:picLocks noChangeAspect="1" noChangeArrowheads="1"/>
+          </p:cNvPicPr>
+          <p:nvPr/>
+        </p:nvPicPr>
+        <p:blipFill>
+          <a:blip r:embed="rId2">
+            <a:extLst>
+              <a:ext uri="{28A0092B-C50C-407E-A947-70E740481C1C}">
+                <a14:useLocalDpi xmlns:a14="http://schemas.microsoft.com/office/drawing/2010/main" val="0"/>
+              </a:ext>
+            </a:extLst>
+          </a:blip>
+          <a:srcRect/>
+          <a:stretch>
+            <a:fillRect/>
+          </a:stretch>
+        </p:blipFill>
+        <p:spPr bwMode="auto">
+          <a:xfrm>
+            <a:off x="0" y="0"/>
+            <a:ext cx="9067800" cy="952500"/>
+          </a:xfrm>
+          <a:prstGeom prst="rect">
+            <a:avLst/>
+          </a:prstGeom>
+          <a:noFill/>
+          <a:extLst>
+            <a:ext uri="{909E8E84-426E-40DD-AFC4-6F175D3DCCD1}">
+              <a14:hiddenFill xmlns:a14="http://schemas.microsoft.com/office/drawing/2010/main">
+                <a:solidFill>
+                  <a:srgbClr val="FFFFFF"/>
+                </a:solidFill>
+              </a14:hiddenFill>
+            </a:ext>
+          </a:extLst>
+        </p:spPr>
+      </p:pic>
+      <p:pic>
+        <p:nvPicPr>
+          <p:cNvPr id="7172" name="Picture 4" descr="page8image42820608">
+            <a:extLst>
+              <a:ext uri="{FF2B5EF4-FFF2-40B4-BE49-F238E27FC236}">
+                <a16:creationId xmlns:a16="http://schemas.microsoft.com/office/drawing/2014/main" id="{D6DAD539-1545-DC40-9903-C4EC6ED01397}"/>
+              </a:ext>
+            </a:extLst>
+          </p:cNvPr>
+          <p:cNvPicPr>
+            <a:picLocks noChangeAspect="1" noChangeArrowheads="1"/>
+          </p:cNvPicPr>
+          <p:nvPr/>
+        </p:nvPicPr>
+        <p:blipFill>
+          <a:blip r:embed="rId2">
+            <a:extLst>
+              <a:ext uri="{28A0092B-C50C-407E-A947-70E740481C1C}">
+                <a14:useLocalDpi xmlns:a14="http://schemas.microsoft.com/office/drawing/2010/main" val="0"/>
+              </a:ext>
+            </a:extLst>
+          </a:blip>
+          <a:srcRect/>
+          <a:stretch>
+            <a:fillRect/>
+          </a:stretch>
+        </p:blipFill>
+        <p:spPr bwMode="auto">
+          <a:xfrm>
+            <a:off x="0" y="0"/>
+            <a:ext cx="9067800" cy="952500"/>
+          </a:xfrm>
+          <a:prstGeom prst="rect">
+            <a:avLst/>
+          </a:prstGeom>
+          <a:noFill/>
+          <a:extLst>
+            <a:ext uri="{909E8E84-426E-40DD-AFC4-6F175D3DCCD1}">
+              <a14:hiddenFill xmlns:a14="http://schemas.microsoft.com/office/drawing/2010/main">
+                <a:solidFill>
+                  <a:srgbClr val="FFFFFF"/>
+                </a:solidFill>
+              </a14:hiddenFill>
+            </a:ext>
+          </a:extLst>
+        </p:spPr>
+      </p:pic>
+      <p:pic>
+        <p:nvPicPr>
+          <p:cNvPr id="7178" name="Picture 10" descr="page8image42820608">
+            <a:extLst>
+              <a:ext uri="{FF2B5EF4-FFF2-40B4-BE49-F238E27FC236}">
+                <a16:creationId xmlns:a16="http://schemas.microsoft.com/office/drawing/2014/main" id="{2607042B-77E4-C44E-979E-A3D3E0435CBD}"/>
+              </a:ext>
+            </a:extLst>
+          </p:cNvPr>
+          <p:cNvPicPr>
+            <a:picLocks noChangeAspect="1" noChangeArrowheads="1"/>
+          </p:cNvPicPr>
+          <p:nvPr/>
+        </p:nvPicPr>
+        <p:blipFill>
+          <a:blip r:embed="rId2">
+            <a:extLst>
+              <a:ext uri="{28A0092B-C50C-407E-A947-70E740481C1C}">
+                <a14:useLocalDpi xmlns:a14="http://schemas.microsoft.com/office/drawing/2010/main" val="0"/>
+              </a:ext>
+            </a:extLst>
+          </a:blip>
+          <a:srcRect/>
+          <a:stretch>
+            <a:fillRect/>
+          </a:stretch>
+        </p:blipFill>
+        <p:spPr bwMode="auto">
+          <a:xfrm>
+            <a:off x="0" y="0"/>
+            <a:ext cx="9067800" cy="952500"/>
+          </a:xfrm>
+          <a:prstGeom prst="rect">
+            <a:avLst/>
+          </a:prstGeom>
+          <a:noFill/>
+          <a:extLst>
+            <a:ext uri="{909E8E84-426E-40DD-AFC4-6F175D3DCCD1}">
+              <a14:hiddenFill xmlns:a14="http://schemas.microsoft.com/office/drawing/2010/main">
+                <a:solidFill>
+                  <a:srgbClr val="FFFFFF"/>
+                </a:solidFill>
+              </a14:hiddenFill>
+            </a:ext>
+          </a:extLst>
+        </p:spPr>
+      </p:pic>
     </p:spTree>
     <p:extLst>
       <p:ext uri="{BB962C8B-B14F-4D97-AF65-F5344CB8AC3E}">

</xml_diff>